<commit_message>
Added my youtube link to the rmd file, knitted it, and moved the powerpoints into the pres folder.
</commit_message>
<xml_diff>
--- a/pres/MLTran_CaseStudy_2_Presentation.pptx
+++ b/pres/MLTran_CaseStudy_2_Presentation.pptx
@@ -5,23 +5,24 @@
     <p:sldMasterId id="2147483708" r:id="rId1"/>
   </p:sldMasterIdLst>
   <p:notesMasterIdLst>
-    <p:notesMasterId r:id="rId13"/>
+    <p:notesMasterId r:id="rId14"/>
   </p:notesMasterIdLst>
   <p:sldIdLst>
     <p:sldId id="256" r:id="rId2"/>
     <p:sldId id="257" r:id="rId3"/>
     <p:sldId id="258" r:id="rId4"/>
-    <p:sldId id="269" r:id="rId5"/>
+    <p:sldId id="277" r:id="rId5"/>
     <p:sldId id="270" r:id="rId6"/>
     <p:sldId id="271" r:id="rId7"/>
     <p:sldId id="272" r:id="rId8"/>
     <p:sldId id="274" r:id="rId9"/>
     <p:sldId id="273" r:id="rId10"/>
     <p:sldId id="276" r:id="rId11"/>
-    <p:sldId id="268" r:id="rId12"/>
+    <p:sldId id="278" r:id="rId12"/>
+    <p:sldId id="268" r:id="rId13"/>
   </p:sldIdLst>
   <p:sldSz cx="12192000" cy="6858000"/>
-  <p:notesSz cx="6858000" cy="9144000"/>
+  <p:notesSz cx="7010400" cy="9296400"/>
   <p:defaultTextStyle>
     <a:defPPr>
       <a:defRPr lang="en-US"/>
@@ -163,14 +164,14 @@
         <p:spPr>
           <a:xfrm>
             <a:off x="0" y="0"/>
-            <a:ext cx="2971800" cy="458788"/>
+            <a:ext cx="3037840" cy="466434"/>
           </a:xfrm>
           <a:prstGeom prst="rect">
             <a:avLst/>
           </a:prstGeom>
         </p:spPr>
         <p:txBody>
-          <a:bodyPr vert="horz" lIns="91440" tIns="45720" rIns="91440" bIns="45720" rtlCol="0"/>
+          <a:bodyPr vert="horz" lIns="93177" tIns="46589" rIns="93177" bIns="46589" rtlCol="0"/>
           <a:lstStyle>
             <a:lvl1pPr algn="l">
               <a:defRPr sz="1200"/>
@@ -193,15 +194,15 @@
         </p:nvSpPr>
         <p:spPr>
           <a:xfrm>
-            <a:off x="3884613" y="0"/>
-            <a:ext cx="2971800" cy="458788"/>
+            <a:off x="3970938" y="0"/>
+            <a:ext cx="3037840" cy="466434"/>
           </a:xfrm>
           <a:prstGeom prst="rect">
             <a:avLst/>
           </a:prstGeom>
         </p:spPr>
         <p:txBody>
-          <a:bodyPr vert="horz" lIns="91440" tIns="45720" rIns="91440" bIns="45720" rtlCol="0"/>
+          <a:bodyPr vert="horz" lIns="93177" tIns="46589" rIns="93177" bIns="46589" rtlCol="0"/>
           <a:lstStyle>
             <a:lvl1pPr algn="r">
               <a:defRPr sz="1200"/>
@@ -210,7 +211,7 @@
           <a:p>
             <a:fld id="{7B08E896-7BC2-4801-9EF8-13EE80B0F038}" type="datetimeFigureOut">
               <a:rPr lang="en-US" smtClean="0"/>
-              <a:t>12/5/2018</a:t>
+              <a:t>12/9/2018</a:t>
             </a:fld>
             <a:endParaRPr lang="en-US"/>
           </a:p>
@@ -228,8 +229,8 @@
         </p:nvSpPr>
         <p:spPr>
           <a:xfrm>
-            <a:off x="685800" y="1143000"/>
-            <a:ext cx="5486400" cy="3086100"/>
+            <a:off x="717550" y="1162050"/>
+            <a:ext cx="5575300" cy="3136900"/>
           </a:xfrm>
           <a:prstGeom prst="rect">
             <a:avLst/>
@@ -242,7 +243,7 @@
           </a:ln>
         </p:spPr>
         <p:txBody>
-          <a:bodyPr vert="horz" lIns="91440" tIns="45720" rIns="91440" bIns="45720" rtlCol="0" anchor="ctr"/>
+          <a:bodyPr vert="horz" lIns="93177" tIns="46589" rIns="93177" bIns="46589" rtlCol="0" anchor="ctr"/>
           <a:lstStyle/>
           <a:p>
             <a:endParaRPr lang="en-US"/>
@@ -261,15 +262,15 @@
         </p:nvSpPr>
         <p:spPr>
           <a:xfrm>
-            <a:off x="685800" y="4400550"/>
-            <a:ext cx="5486400" cy="3600450"/>
+            <a:off x="701040" y="4473892"/>
+            <a:ext cx="5608320" cy="3660458"/>
           </a:xfrm>
           <a:prstGeom prst="rect">
             <a:avLst/>
           </a:prstGeom>
         </p:spPr>
         <p:txBody>
-          <a:bodyPr vert="horz" lIns="91440" tIns="45720" rIns="91440" bIns="45720" rtlCol="0"/>
+          <a:bodyPr vert="horz" lIns="93177" tIns="46589" rIns="93177" bIns="46589" rtlCol="0"/>
           <a:lstStyle/>
           <a:p>
             <a:pPr lvl="0"/>
@@ -321,15 +322,15 @@
         </p:nvSpPr>
         <p:spPr>
           <a:xfrm>
-            <a:off x="0" y="8685213"/>
-            <a:ext cx="2971800" cy="458787"/>
+            <a:off x="0" y="8829967"/>
+            <a:ext cx="3037840" cy="466433"/>
           </a:xfrm>
           <a:prstGeom prst="rect">
             <a:avLst/>
           </a:prstGeom>
         </p:spPr>
         <p:txBody>
-          <a:bodyPr vert="horz" lIns="91440" tIns="45720" rIns="91440" bIns="45720" rtlCol="0" anchor="b"/>
+          <a:bodyPr vert="horz" lIns="93177" tIns="46589" rIns="93177" bIns="46589" rtlCol="0" anchor="b"/>
           <a:lstStyle>
             <a:lvl1pPr algn="l">
               <a:defRPr sz="1200"/>
@@ -352,15 +353,15 @@
         </p:nvSpPr>
         <p:spPr>
           <a:xfrm>
-            <a:off x="3884613" y="8685213"/>
-            <a:ext cx="2971800" cy="458787"/>
+            <a:off x="3970938" y="8829967"/>
+            <a:ext cx="3037840" cy="466433"/>
           </a:xfrm>
           <a:prstGeom prst="rect">
             <a:avLst/>
           </a:prstGeom>
         </p:spPr>
         <p:txBody>
-          <a:bodyPr vert="horz" lIns="91440" tIns="45720" rIns="91440" bIns="45720" rtlCol="0" anchor="b"/>
+          <a:bodyPr vert="horz" lIns="93177" tIns="46589" rIns="93177" bIns="46589" rtlCol="0" anchor="b"/>
           <a:lstStyle>
             <a:lvl1pPr algn="r">
               <a:defRPr sz="1200"/>
@@ -523,12 +524,8 @@
           <a:lstStyle/>
           <a:p>
             <a:r>
-              <a:rPr lang="en-US" dirty="0" smtClean="0"/>
-              <a:t>Good</a:t>
-            </a:r>
-            <a:r>
               <a:rPr lang="en-US" baseline="0" dirty="0" smtClean="0"/>
-              <a:t> Morning</a:t>
+              <a:t>Hello</a:t>
             </a:r>
           </a:p>
           <a:p>
@@ -540,7 +537,7 @@
           <a:p>
             <a:r>
               <a:rPr lang="en-US" baseline="0" dirty="0" smtClean="0"/>
-              <a:t>We’re excited to share with you the results of our analysis of the domestic beers and breweries</a:t>
+              <a:t>We’re excited to share with you our talent management analysis from your employee data</a:t>
             </a:r>
             <a:endParaRPr lang="en-US" dirty="0"/>
           </a:p>
@@ -573,6 +570,341 @@
     <p:extLst>
       <p:ext uri="{BB962C8B-B14F-4D97-AF65-F5344CB8AC3E}">
         <p14:creationId xmlns:p14="http://schemas.microsoft.com/office/powerpoint/2010/main" val="3979927918"/>
+      </p:ext>
+    </p:extLst>
+  </p:cSld>
+  <p:clrMapOvr>
+    <a:masterClrMapping/>
+  </p:clrMapOvr>
+</p:notes>
+</file>
+
+<file path=ppt/notesSlides/notesSlide10.xml><?xml version="1.0" encoding="utf-8"?>
+<p:notes xmlns:a="http://schemas.openxmlformats.org/drawingml/2006/main" xmlns:r="http://schemas.openxmlformats.org/officeDocument/2006/relationships" xmlns:p="http://schemas.openxmlformats.org/presentationml/2006/main">
+  <p:cSld>
+    <p:spTree>
+      <p:nvGrpSpPr>
+        <p:cNvPr id="1" name=""/>
+        <p:cNvGrpSpPr/>
+        <p:nvPr/>
+      </p:nvGrpSpPr>
+      <p:grpSpPr>
+        <a:xfrm>
+          <a:off x="0" y="0"/>
+          <a:ext cx="0" cy="0"/>
+          <a:chOff x="0" y="0"/>
+          <a:chExt cx="0" cy="0"/>
+        </a:xfrm>
+      </p:grpSpPr>
+      <p:sp>
+        <p:nvSpPr>
+          <p:cNvPr id="2" name="Slide Image Placeholder 1"/>
+          <p:cNvSpPr>
+            <a:spLocks noGrp="1" noRot="1" noChangeAspect="1"/>
+          </p:cNvSpPr>
+          <p:nvPr>
+            <p:ph type="sldImg"/>
+          </p:nvPr>
+        </p:nvSpPr>
+        <p:spPr/>
+      </p:sp>
+      <p:sp>
+        <p:nvSpPr>
+          <p:cNvPr id="3" name="Notes Placeholder 2"/>
+          <p:cNvSpPr>
+            <a:spLocks noGrp="1"/>
+          </p:cNvSpPr>
+          <p:nvPr>
+            <p:ph type="body" idx="1"/>
+          </p:nvPr>
+        </p:nvSpPr>
+        <p:spPr/>
+        <p:txBody>
+          <a:bodyPr/>
+          <a:lstStyle/>
+          <a:p>
+            <a:r>
+              <a:rPr lang="en-US" dirty="0" smtClean="0"/>
+              <a:t>Job </a:t>
+            </a:r>
+            <a:r>
+              <a:rPr lang="en-US" dirty="0"/>
+              <a:t>Involvement was the only variable that overlapped with our preliminary analysis</a:t>
+            </a:r>
+          </a:p>
+          <a:p>
+            <a:r>
+              <a:rPr lang="en-US" dirty="0"/>
+              <a:t>Job, Relationship, and Environment Satisfaction while not by themselves are significant with Job Role, they are contributing factors to turnover in conjunction with the other </a:t>
+            </a:r>
+            <a:r>
+              <a:rPr lang="en-US" dirty="0" smtClean="0"/>
+              <a:t>variables</a:t>
+            </a:r>
+          </a:p>
+          <a:p>
+            <a:r>
+              <a:rPr lang="en-US" dirty="0" smtClean="0"/>
+              <a:t>But</a:t>
+            </a:r>
+            <a:r>
+              <a:rPr lang="en-US" baseline="0" dirty="0" smtClean="0"/>
+              <a:t> managing to less variables would surely be less complex?</a:t>
+            </a:r>
+            <a:endParaRPr lang="en-US" dirty="0"/>
+          </a:p>
+        </p:txBody>
+      </p:sp>
+      <p:sp>
+        <p:nvSpPr>
+          <p:cNvPr id="4" name="Slide Number Placeholder 3"/>
+          <p:cNvSpPr>
+            <a:spLocks noGrp="1"/>
+          </p:cNvSpPr>
+          <p:nvPr>
+            <p:ph type="sldNum" sz="quarter" idx="10"/>
+          </p:nvPr>
+        </p:nvSpPr>
+        <p:spPr/>
+        <p:txBody>
+          <a:bodyPr/>
+          <a:lstStyle/>
+          <a:p>
+            <a:fld id="{1CD20D18-C2BB-4D17-BF0D-F161849BA92D}" type="slidenum">
+              <a:rPr lang="en-US" smtClean="0"/>
+              <a:t>10</a:t>
+            </a:fld>
+            <a:endParaRPr lang="en-US"/>
+          </a:p>
+        </p:txBody>
+      </p:sp>
+    </p:spTree>
+    <p:extLst>
+      <p:ext uri="{BB962C8B-B14F-4D97-AF65-F5344CB8AC3E}">
+        <p14:creationId xmlns:p14="http://schemas.microsoft.com/office/powerpoint/2010/main" val="1488775007"/>
+      </p:ext>
+    </p:extLst>
+  </p:cSld>
+  <p:clrMapOvr>
+    <a:masterClrMapping/>
+  </p:clrMapOvr>
+</p:notes>
+</file>
+
+<file path=ppt/notesSlides/notesSlide11.xml><?xml version="1.0" encoding="utf-8"?>
+<p:notes xmlns:a="http://schemas.openxmlformats.org/drawingml/2006/main" xmlns:r="http://schemas.openxmlformats.org/officeDocument/2006/relationships" xmlns:p="http://schemas.openxmlformats.org/presentationml/2006/main">
+  <p:cSld>
+    <p:spTree>
+      <p:nvGrpSpPr>
+        <p:cNvPr id="1" name=""/>
+        <p:cNvGrpSpPr/>
+        <p:nvPr/>
+      </p:nvGrpSpPr>
+      <p:grpSpPr>
+        <a:xfrm>
+          <a:off x="0" y="0"/>
+          <a:ext cx="0" cy="0"/>
+          <a:chOff x="0" y="0"/>
+          <a:chExt cx="0" cy="0"/>
+        </a:xfrm>
+      </p:grpSpPr>
+      <p:sp>
+        <p:nvSpPr>
+          <p:cNvPr id="2" name="Slide Image Placeholder 1"/>
+          <p:cNvSpPr>
+            <a:spLocks noGrp="1" noRot="1" noChangeAspect="1"/>
+          </p:cNvSpPr>
+          <p:nvPr>
+            <p:ph type="sldImg"/>
+          </p:nvPr>
+        </p:nvSpPr>
+        <p:spPr/>
+      </p:sp>
+      <p:sp>
+        <p:nvSpPr>
+          <p:cNvPr id="3" name="Notes Placeholder 2"/>
+          <p:cNvSpPr>
+            <a:spLocks noGrp="1"/>
+          </p:cNvSpPr>
+          <p:nvPr>
+            <p:ph type="body" idx="1"/>
+          </p:nvPr>
+        </p:nvSpPr>
+        <p:spPr/>
+        <p:txBody>
+          <a:bodyPr/>
+          <a:lstStyle/>
+          <a:p>
+            <a:r>
+              <a:rPr lang="en-US" dirty="0" smtClean="0"/>
+              <a:t>As it turns</a:t>
+            </a:r>
+            <a:r>
+              <a:rPr lang="en-US" baseline="0" dirty="0" smtClean="0"/>
+              <a:t> out, t</a:t>
+            </a:r>
+            <a:r>
+              <a:rPr lang="en-US" dirty="0" smtClean="0"/>
+              <a:t>here</a:t>
+            </a:r>
+            <a:r>
+              <a:rPr lang="en-US" baseline="0" dirty="0" smtClean="0"/>
+              <a:t> is a logistic regression model that provides an 85% accuracy rate with 5 variables as opposed to the 87% overall accuracy</a:t>
+            </a:r>
+          </a:p>
+          <a:p>
+            <a:r>
+              <a:rPr lang="en-US" baseline="0" dirty="0" smtClean="0"/>
+              <a:t>These five terms using a k Nearest Neighbor model yields an 84% overall accuracy rate</a:t>
+            </a:r>
+          </a:p>
+          <a:p>
+            <a:r>
+              <a:rPr lang="en-US" baseline="0" dirty="0" smtClean="0"/>
+              <a:t>Comparing all 3 models and there statistics, we recommend the simpler 5-variable logistic regression</a:t>
+            </a:r>
+          </a:p>
+          <a:p>
+            <a:endParaRPr lang="en-US" baseline="0" dirty="0" smtClean="0"/>
+          </a:p>
+          <a:p>
+            <a:r>
+              <a:rPr lang="en-US" baseline="0" dirty="0" smtClean="0"/>
+              <a:t>We hope this helps you with your predictions in attrition</a:t>
+            </a:r>
+          </a:p>
+          <a:p>
+            <a:r>
+              <a:rPr lang="en-US" baseline="0" dirty="0" smtClean="0"/>
+              <a:t>Thank you very much for your time</a:t>
+            </a:r>
+          </a:p>
+          <a:p>
+            <a:r>
+              <a:rPr lang="en-US" baseline="0" dirty="0" smtClean="0"/>
+              <a:t>We welcome further questions </a:t>
+            </a:r>
+            <a:r>
+              <a:rPr lang="en-US" baseline="0" smtClean="0"/>
+              <a:t>and feedback from you</a:t>
+            </a:r>
+          </a:p>
+          <a:p>
+            <a:endParaRPr lang="en-US" baseline="0" dirty="0" smtClean="0"/>
+          </a:p>
+        </p:txBody>
+      </p:sp>
+      <p:sp>
+        <p:nvSpPr>
+          <p:cNvPr id="4" name="Slide Number Placeholder 3"/>
+          <p:cNvSpPr>
+            <a:spLocks noGrp="1"/>
+          </p:cNvSpPr>
+          <p:nvPr>
+            <p:ph type="sldNum" sz="quarter" idx="10"/>
+          </p:nvPr>
+        </p:nvSpPr>
+        <p:spPr/>
+        <p:txBody>
+          <a:bodyPr/>
+          <a:lstStyle/>
+          <a:p>
+            <a:fld id="{1CD20D18-C2BB-4D17-BF0D-F161849BA92D}" type="slidenum">
+              <a:rPr lang="en-US" smtClean="0"/>
+              <a:t>11</a:t>
+            </a:fld>
+            <a:endParaRPr lang="en-US"/>
+          </a:p>
+        </p:txBody>
+      </p:sp>
+    </p:spTree>
+    <p:extLst>
+      <p:ext uri="{BB962C8B-B14F-4D97-AF65-F5344CB8AC3E}">
+        <p14:creationId xmlns:p14="http://schemas.microsoft.com/office/powerpoint/2010/main" val="1289665255"/>
+      </p:ext>
+    </p:extLst>
+  </p:cSld>
+  <p:clrMapOvr>
+    <a:masterClrMapping/>
+  </p:clrMapOvr>
+</p:notes>
+</file>
+
+<file path=ppt/notesSlides/notesSlide12.xml><?xml version="1.0" encoding="utf-8"?>
+<p:notes xmlns:a="http://schemas.openxmlformats.org/drawingml/2006/main" xmlns:r="http://schemas.openxmlformats.org/officeDocument/2006/relationships" xmlns:p="http://schemas.openxmlformats.org/presentationml/2006/main">
+  <p:cSld>
+    <p:spTree>
+      <p:nvGrpSpPr>
+        <p:cNvPr id="1" name=""/>
+        <p:cNvGrpSpPr/>
+        <p:nvPr/>
+      </p:nvGrpSpPr>
+      <p:grpSpPr>
+        <a:xfrm>
+          <a:off x="0" y="0"/>
+          <a:ext cx="0" cy="0"/>
+          <a:chOff x="0" y="0"/>
+          <a:chExt cx="0" cy="0"/>
+        </a:xfrm>
+      </p:grpSpPr>
+      <p:sp>
+        <p:nvSpPr>
+          <p:cNvPr id="2" name="Slide Image Placeholder 1"/>
+          <p:cNvSpPr>
+            <a:spLocks noGrp="1" noRot="1" noChangeAspect="1"/>
+          </p:cNvSpPr>
+          <p:nvPr>
+            <p:ph type="sldImg"/>
+          </p:nvPr>
+        </p:nvSpPr>
+        <p:spPr/>
+      </p:sp>
+      <p:sp>
+        <p:nvSpPr>
+          <p:cNvPr id="3" name="Notes Placeholder 2"/>
+          <p:cNvSpPr>
+            <a:spLocks noGrp="1"/>
+          </p:cNvSpPr>
+          <p:nvPr>
+            <p:ph type="body" idx="1"/>
+          </p:nvPr>
+        </p:nvSpPr>
+        <p:spPr/>
+        <p:txBody>
+          <a:bodyPr/>
+          <a:lstStyle/>
+          <a:p>
+            <a:endParaRPr lang="en-US"/>
+          </a:p>
+        </p:txBody>
+      </p:sp>
+      <p:sp>
+        <p:nvSpPr>
+          <p:cNvPr id="4" name="Slide Number Placeholder 3"/>
+          <p:cNvSpPr>
+            <a:spLocks noGrp="1"/>
+          </p:cNvSpPr>
+          <p:nvPr>
+            <p:ph type="sldNum" sz="quarter" idx="10"/>
+          </p:nvPr>
+        </p:nvSpPr>
+        <p:spPr/>
+        <p:txBody>
+          <a:bodyPr/>
+          <a:lstStyle/>
+          <a:p>
+            <a:fld id="{1CD20D18-C2BB-4D17-BF0D-F161849BA92D}" type="slidenum">
+              <a:rPr lang="en-US" smtClean="0"/>
+              <a:t>12</a:t>
+            </a:fld>
+            <a:endParaRPr lang="en-US"/>
+          </a:p>
+        </p:txBody>
+      </p:sp>
+    </p:spTree>
+    <p:extLst>
+      <p:ext uri="{BB962C8B-B14F-4D97-AF65-F5344CB8AC3E}">
+        <p14:creationId xmlns:p14="http://schemas.microsoft.com/office/powerpoint/2010/main" val="2430544552"/>
       </p:ext>
     </p:extLst>
   </p:cSld>
@@ -710,20 +1042,6 @@
           <a:bodyPr/>
           <a:lstStyle/>
           <a:p>
-            <a:r>
-              <a:rPr lang="en-US" dirty="0" smtClean="0"/>
-              <a:t>Our methodology</a:t>
-            </a:r>
-            <a:r>
-              <a:rPr lang="en-US" baseline="0" dirty="0" smtClean="0"/>
-              <a:t> is to perform an exploratory data analysis of the collected data</a:t>
-            </a:r>
-          </a:p>
-          <a:p>
-            <a:r>
-              <a:rPr lang="en-US" baseline="0" dirty="0" smtClean="0"/>
-              <a:t>That is we wrangled with the data by quantifying, merging, plotting it to identify and determine relationships for insights </a:t>
-            </a:r>
             <a:endParaRPr lang="en-US" dirty="0"/>
           </a:p>
         </p:txBody>
@@ -810,75 +1128,19 @@
           <a:p>
             <a:r>
               <a:rPr lang="en-US" dirty="0" smtClean="0"/>
-              <a:t>Of the</a:t>
+              <a:t>An</a:t>
             </a:r>
             <a:r>
               <a:rPr lang="en-US" baseline="0" dirty="0" smtClean="0"/>
-              <a:t> 37 variables, our preliminary analysis suggested that there are 14 statistically significant variables with attrition using the Welch’s ANOVA test</a:t>
-            </a:r>
-          </a:p>
-          <a:p>
-            <a:r>
-              <a:rPr lang="en-US" sz="1200" kern="1200" dirty="0" smtClean="0">
-                <a:solidFill>
-                  <a:schemeClr val="tx1"/>
-                </a:solidFill>
-                <a:effectLst/>
-                <a:latin typeface="+mn-lt"/>
-                <a:ea typeface="+mn-ea"/>
-                <a:cs typeface="+mn-cs"/>
-              </a:rPr>
-              <a:t>That</a:t>
-            </a:r>
-            <a:r>
-              <a:rPr lang="en-US" sz="1200" kern="1200" baseline="0" dirty="0" smtClean="0">
-                <a:solidFill>
-                  <a:schemeClr val="tx1"/>
-                </a:solidFill>
-                <a:effectLst/>
-                <a:latin typeface="+mn-lt"/>
-                <a:ea typeface="+mn-ea"/>
-                <a:cs typeface="+mn-cs"/>
-              </a:rPr>
-              <a:t> is, we found the p-value, or </a:t>
-            </a:r>
-            <a:r>
-              <a:rPr lang="en-US" sz="1200" kern="1200" dirty="0" smtClean="0">
-                <a:solidFill>
-                  <a:schemeClr val="tx1"/>
-                </a:solidFill>
-                <a:effectLst/>
-                <a:latin typeface="+mn-lt"/>
-                <a:ea typeface="+mn-ea"/>
-                <a:cs typeface="+mn-cs"/>
-              </a:rPr>
-              <a:t>probability of observing by random chance a result as extreme or more extreme than what was observed under the assumption that a given has</a:t>
-            </a:r>
-            <a:r>
-              <a:rPr lang="en-US" sz="1200" kern="1200" baseline="0" dirty="0" smtClean="0">
-                <a:solidFill>
-                  <a:schemeClr val="tx1"/>
-                </a:solidFill>
-                <a:effectLst/>
-                <a:latin typeface="+mn-lt"/>
-                <a:ea typeface="+mn-ea"/>
-                <a:cs typeface="+mn-cs"/>
-              </a:rPr>
-              <a:t> no impact with attrition</a:t>
-            </a:r>
-          </a:p>
-          <a:p>
-            <a:r>
-              <a:rPr lang="en-US" sz="1200" kern="1200" baseline="0" dirty="0" smtClean="0">
-                <a:solidFill>
-                  <a:schemeClr val="tx1"/>
-                </a:solidFill>
-                <a:effectLst/>
-                <a:latin typeface="+mn-lt"/>
-                <a:ea typeface="+mn-ea"/>
-                <a:cs typeface="+mn-cs"/>
-              </a:rPr>
-              <a:t>Surprisingly, Job Role was not among the variables that held statistical significance with Attrition, so given the four survey questions about job satisfaction, environment satisfaction, relationship satisfaction, and work life balance we decided to further explore the responses by role</a:t>
+              <a:t> example of our correlation assessment compared the values of </a:t>
+            </a:r>
+            <a:r>
+              <a:rPr lang="en-US" baseline="0" dirty="0" err="1" smtClean="0"/>
+              <a:t>Attriotion</a:t>
+            </a:r>
+            <a:r>
+              <a:rPr lang="en-US" baseline="0" dirty="0" smtClean="0"/>
+              <a:t> vs. Training Times Last Year, Work Life Balance, Years at Company, then each of the subsequent variables with one another in pairs</a:t>
             </a:r>
             <a:endParaRPr lang="en-US" dirty="0"/>
           </a:p>
@@ -901,7 +1163,7 @@
           <a:p>
             <a:fld id="{1CD20D18-C2BB-4D17-BF0D-F161849BA92D}" type="slidenum">
               <a:rPr lang="en-US" smtClean="0"/>
-              <a:t>5</a:t>
+              <a:t>4</a:t>
             </a:fld>
             <a:endParaRPr lang="en-US"/>
           </a:p>
@@ -910,7 +1172,7 @@
     </p:spTree>
     <p:extLst>
       <p:ext uri="{BB962C8B-B14F-4D97-AF65-F5344CB8AC3E}">
-        <p14:creationId xmlns:p14="http://schemas.microsoft.com/office/powerpoint/2010/main" val="2669765287"/>
+        <p14:creationId xmlns:p14="http://schemas.microsoft.com/office/powerpoint/2010/main" val="2628229376"/>
       </p:ext>
     </p:extLst>
   </p:cSld>
@@ -966,7 +1228,53 @@
           <a:p>
             <a:r>
               <a:rPr lang="en-US" dirty="0" smtClean="0"/>
-              <a:t>While there was not a statistical significance in job satisfaction between the roles (p-value 0.9079), Research Scientists and Healthcare Representatives both have the highest equal mean in job satisfaction at 2.80 in Medium-High range. Human Resources have the lowest mean at 2.57.</a:t>
+              <a:t>Of the</a:t>
+            </a:r>
+            <a:r>
+              <a:rPr lang="en-US" baseline="0" dirty="0" smtClean="0"/>
+              <a:t> 37 variables, our preliminary analysis suggested that there are 14 statistically significant variables with attrition that could contribute to attrition</a:t>
+            </a:r>
+          </a:p>
+          <a:p>
+            <a:endParaRPr lang="en-US" dirty="0" smtClean="0"/>
+          </a:p>
+          <a:p>
+            <a:r>
+              <a:rPr lang="en-US" dirty="0" smtClean="0"/>
+              <a:t>Surprisingly</a:t>
+            </a:r>
+            <a:r>
+              <a:rPr lang="en-US" dirty="0"/>
+              <a:t>, Job Role was not among the variables that held statistical significance with </a:t>
+            </a:r>
+            <a:r>
+              <a:rPr lang="en-US" dirty="0" smtClean="0"/>
+              <a:t>Attrition.</a:t>
+            </a:r>
+          </a:p>
+          <a:p>
+            <a:endParaRPr lang="en-US" dirty="0" smtClean="0"/>
+          </a:p>
+          <a:p>
+            <a:r>
+              <a:rPr lang="en-US" dirty="0" smtClean="0"/>
+              <a:t>Given </a:t>
+            </a:r>
+            <a:r>
+              <a:rPr lang="en-US" dirty="0"/>
+              <a:t>the four survey questions about job, environment, relationship satisfaction, and work life </a:t>
+            </a:r>
+            <a:r>
+              <a:rPr lang="en-US" dirty="0" smtClean="0"/>
+              <a:t>balance, </a:t>
+            </a:r>
+            <a:r>
+              <a:rPr lang="en-US" dirty="0"/>
+              <a:t>we decided to further explore the responses by </a:t>
+            </a:r>
+            <a:r>
+              <a:rPr lang="en-US" dirty="0" smtClean="0"/>
+              <a:t>role.</a:t>
             </a:r>
             <a:endParaRPr lang="en-US" dirty="0"/>
           </a:p>
@@ -989,7 +1297,7 @@
           <a:p>
             <a:fld id="{1CD20D18-C2BB-4D17-BF0D-F161849BA92D}" type="slidenum">
               <a:rPr lang="en-US" smtClean="0"/>
-              <a:t>6</a:t>
+              <a:t>5</a:t>
             </a:fld>
             <a:endParaRPr lang="en-US"/>
           </a:p>
@@ -998,7 +1306,7 @@
     </p:spTree>
     <p:extLst>
       <p:ext uri="{BB962C8B-B14F-4D97-AF65-F5344CB8AC3E}">
-        <p14:creationId xmlns:p14="http://schemas.microsoft.com/office/powerpoint/2010/main" val="1417253976"/>
+        <p14:creationId xmlns:p14="http://schemas.microsoft.com/office/powerpoint/2010/main" val="2669765287"/>
       </p:ext>
     </p:extLst>
   </p:cSld>
@@ -1052,6 +1360,56 @@
           <a:bodyPr/>
           <a:lstStyle/>
           <a:p>
+            <a:r>
+              <a:rPr lang="en-US" dirty="0" smtClean="0"/>
+              <a:t>So,</a:t>
+            </a:r>
+            <a:r>
+              <a:rPr lang="en-US" baseline="0" dirty="0" smtClean="0"/>
+              <a:t> how important is job satisfaction?</a:t>
+            </a:r>
+            <a:endParaRPr lang="en-US" dirty="0" smtClean="0"/>
+          </a:p>
+          <a:p>
+            <a:r>
+              <a:rPr lang="en-US" dirty="0" smtClean="0"/>
+              <a:t>While there was not a statistical significance in job satisfaction between the roles (p-value 0.9079), </a:t>
+            </a:r>
+          </a:p>
+          <a:p>
+            <a:r>
+              <a:rPr lang="en-US" dirty="0" smtClean="0"/>
+              <a:t>Research Scientists and Healthcare Representatives both have the highest equal mean in job satisfaction at 2.80 in Medium-High range. </a:t>
+            </a:r>
+          </a:p>
+          <a:p>
+            <a:r>
+              <a:rPr lang="en-US" dirty="0" smtClean="0"/>
+              <a:t>34%</a:t>
+            </a:r>
+            <a:r>
+              <a:rPr lang="en-US" baseline="0" dirty="0" smtClean="0"/>
+              <a:t> of Research Scientists reported Very High job satisfaction</a:t>
+            </a:r>
+          </a:p>
+          <a:p>
+            <a:r>
+              <a:rPr lang="en-US" baseline="0" dirty="0" smtClean="0"/>
+              <a:t>35% of Healthcare Representatives reported the same</a:t>
+            </a:r>
+            <a:endParaRPr lang="en-US" dirty="0" smtClean="0"/>
+          </a:p>
+          <a:p>
+            <a:r>
+              <a:rPr lang="en-US" dirty="0" smtClean="0"/>
+              <a:t>Human Resources have the lowest mean at 2.57</a:t>
+            </a:r>
+            <a:r>
+              <a:rPr lang="en-US" baseline="0" dirty="0" smtClean="0"/>
+              <a:t> with 30% reporting High job satisfaction</a:t>
+            </a:r>
+          </a:p>
+          <a:p>
             <a:pPr marL="0" marR="0" lvl="0" indent="0" algn="l" defTabSz="914400" rtl="0" eaLnBrk="1" fontAlgn="auto" latinLnBrk="0" hangingPunct="1">
               <a:lnSpc>
                 <a:spcPct val="100000"/>
@@ -1069,18 +1427,7 @@
               <a:tabLst/>
               <a:defRPr/>
             </a:pPr>
-            <a:r>
-              <a:rPr lang="en-US" sz="1200" b="0" i="0" kern="1200" dirty="0" smtClean="0">
-                <a:solidFill>
-                  <a:schemeClr val="tx1"/>
-                </a:solidFill>
-                <a:effectLst/>
-                <a:latin typeface="+mn-lt"/>
-                <a:ea typeface="+mn-ea"/>
-                <a:cs typeface="+mn-cs"/>
-              </a:rPr>
-              <a:t>The mean environment satisfaction for all job roles is 2.71 in Medium-High range </a:t>
-            </a:r>
+            <a:endParaRPr lang="en-US" dirty="0" smtClean="0"/>
           </a:p>
           <a:p>
             <a:pPr marL="0" marR="0" lvl="0" indent="0" algn="l" defTabSz="914400" rtl="0" eaLnBrk="1" fontAlgn="auto" latinLnBrk="0" hangingPunct="1">
@@ -1101,79 +1448,14 @@
               <a:defRPr/>
             </a:pPr>
             <a:r>
-              <a:rPr lang="en-US" sz="1200" b="0" i="0" kern="1200" dirty="0" smtClean="0">
-                <a:solidFill>
-                  <a:schemeClr val="tx1"/>
-                </a:solidFill>
-                <a:effectLst/>
-                <a:latin typeface="+mn-lt"/>
-                <a:ea typeface="+mn-ea"/>
-                <a:cs typeface="+mn-cs"/>
-              </a:rPr>
-              <a:t>Manufacturing Directors have the highest mean environment satisfaction at 2.90 </a:t>
-            </a:r>
-          </a:p>
-          <a:p>
-            <a:pPr marL="0" marR="0" lvl="0" indent="0" algn="l" defTabSz="914400" rtl="0" eaLnBrk="1" fontAlgn="auto" latinLnBrk="0" hangingPunct="1">
-              <a:lnSpc>
-                <a:spcPct val="100000"/>
-              </a:lnSpc>
-              <a:spcBef>
-                <a:spcPts val="0"/>
-              </a:spcBef>
-              <a:spcAft>
-                <a:spcPts val="0"/>
-              </a:spcAft>
-              <a:buClrTx/>
-              <a:buSzTx/>
-              <a:buFontTx/>
-              <a:buNone/>
-              <a:tabLst/>
-              <a:defRPr/>
-            </a:pPr>
-            <a:r>
-              <a:rPr lang="en-US" sz="1200" b="0" i="0" kern="1200" dirty="0" smtClean="0">
-                <a:solidFill>
-                  <a:schemeClr val="tx1"/>
-                </a:solidFill>
-                <a:effectLst/>
-                <a:latin typeface="+mn-lt"/>
-                <a:ea typeface="+mn-ea"/>
-                <a:cs typeface="+mn-cs"/>
-              </a:rPr>
-              <a:t>Research Directors have the lowest mean environment satisfaction at 2.39</a:t>
-            </a:r>
-          </a:p>
-          <a:p>
-            <a:pPr marL="0" marR="0" lvl="0" indent="0" algn="l" defTabSz="914400" rtl="0" eaLnBrk="1" fontAlgn="auto" latinLnBrk="0" hangingPunct="1">
-              <a:lnSpc>
-                <a:spcPct val="100000"/>
-              </a:lnSpc>
-              <a:spcBef>
-                <a:spcPts val="0"/>
-              </a:spcBef>
-              <a:spcAft>
-                <a:spcPts val="0"/>
-              </a:spcAft>
-              <a:buClrTx/>
-              <a:buSzTx/>
-              <a:buFontTx/>
-              <a:buNone/>
-              <a:tabLst/>
-              <a:defRPr/>
-            </a:pPr>
-            <a:r>
-              <a:rPr lang="en-US" sz="1200" b="0" i="0" kern="1200" dirty="0" smtClean="0">
-                <a:solidFill>
-                  <a:schemeClr val="tx1"/>
-                </a:solidFill>
-                <a:effectLst/>
-                <a:latin typeface="+mn-lt"/>
-                <a:ea typeface="+mn-ea"/>
-                <a:cs typeface="+mn-cs"/>
-              </a:rPr>
-              <a:t>The difference is not statistically significant at p-value 0.2330.</a:t>
-            </a:r>
+              <a:rPr lang="en-US" dirty="0" smtClean="0"/>
+              <a:t>The</a:t>
+            </a:r>
+            <a:r>
+              <a:rPr lang="en-US" baseline="0" dirty="0" smtClean="0"/>
+              <a:t> second question in the survey was how important is environment satisfaction?</a:t>
+            </a:r>
+            <a:endParaRPr lang="en-US" dirty="0" smtClean="0"/>
           </a:p>
           <a:p>
             <a:endParaRPr lang="en-US" dirty="0"/>
@@ -1197,7 +1479,7 @@
           <a:p>
             <a:fld id="{1CD20D18-C2BB-4D17-BF0D-F161849BA92D}" type="slidenum">
               <a:rPr lang="en-US" smtClean="0"/>
-              <a:t>7</a:t>
+              <a:t>6</a:t>
             </a:fld>
             <a:endParaRPr lang="en-US"/>
           </a:p>
@@ -1206,7 +1488,7 @@
     </p:spTree>
     <p:extLst>
       <p:ext uri="{BB962C8B-B14F-4D97-AF65-F5344CB8AC3E}">
-        <p14:creationId xmlns:p14="http://schemas.microsoft.com/office/powerpoint/2010/main" val="3444890963"/>
+        <p14:creationId xmlns:p14="http://schemas.microsoft.com/office/powerpoint/2010/main" val="1417253976"/>
       </p:ext>
     </p:extLst>
   </p:cSld>
@@ -1260,93 +1542,71 @@
           <a:bodyPr/>
           <a:lstStyle/>
           <a:p>
-            <a:r>
-              <a:rPr lang="en-US" sz="1200" b="0" i="0" kern="1200" dirty="0" smtClean="0">
-                <a:solidFill>
-                  <a:schemeClr val="tx1"/>
-                </a:solidFill>
-                <a:effectLst/>
-                <a:latin typeface="+mn-lt"/>
-                <a:ea typeface="+mn-ea"/>
-                <a:cs typeface="+mn-cs"/>
-              </a:rPr>
-              <a:t>The mean relationship satisfaction for all job roles ranged from a mean</a:t>
-            </a:r>
-            <a:r>
-              <a:rPr lang="en-US" sz="1200" b="0" i="0" kern="1200" baseline="0" dirty="0" smtClean="0">
-                <a:solidFill>
-                  <a:schemeClr val="tx1"/>
-                </a:solidFill>
-                <a:effectLst/>
-                <a:latin typeface="+mn-lt"/>
-                <a:ea typeface="+mn-ea"/>
-                <a:cs typeface="+mn-cs"/>
-              </a:rPr>
-              <a:t> of </a:t>
-            </a:r>
-            <a:r>
-              <a:rPr lang="en-US" sz="1200" b="0" i="0" kern="1200" dirty="0" smtClean="0">
-                <a:solidFill>
-                  <a:schemeClr val="tx1"/>
-                </a:solidFill>
-                <a:effectLst/>
-                <a:latin typeface="+mn-lt"/>
-                <a:ea typeface="+mn-ea"/>
-                <a:cs typeface="+mn-cs"/>
-              </a:rPr>
-              <a:t>2.50 to 2.77</a:t>
-            </a:r>
-          </a:p>
-          <a:p>
-            <a:r>
-              <a:rPr lang="en-US" sz="1200" b="0" i="0" kern="1200" dirty="0" smtClean="0">
-                <a:solidFill>
-                  <a:schemeClr val="tx1"/>
-                </a:solidFill>
-                <a:effectLst/>
-                <a:latin typeface="+mn-lt"/>
-                <a:ea typeface="+mn-ea"/>
-                <a:cs typeface="+mn-cs"/>
-              </a:rPr>
-              <a:t>Albeit at a p-value 0.9362, the difference is not statistically significant between the roles. </a:t>
-            </a:r>
-          </a:p>
-          <a:p>
-            <a:r>
-              <a:rPr lang="en-US" sz="1200" b="0" i="0" kern="1200" dirty="0" smtClean="0">
-                <a:solidFill>
-                  <a:schemeClr val="tx1"/>
-                </a:solidFill>
-                <a:effectLst/>
-                <a:latin typeface="+mn-lt"/>
-                <a:ea typeface="+mn-ea"/>
-                <a:cs typeface="+mn-cs"/>
-              </a:rPr>
-              <a:t>Managers have the highest mean relationship satisfaction </a:t>
-            </a:r>
-          </a:p>
-          <a:p>
-            <a:r>
-              <a:rPr lang="en-US" sz="1200" b="0" i="0" kern="1200" dirty="0" smtClean="0">
-                <a:solidFill>
-                  <a:schemeClr val="tx1"/>
-                </a:solidFill>
-                <a:effectLst/>
-                <a:latin typeface="+mn-lt"/>
-                <a:ea typeface="+mn-ea"/>
-                <a:cs typeface="+mn-cs"/>
-              </a:rPr>
-              <a:t>Sales Representatives have the lowest mean.</a:t>
-            </a:r>
-            <a:endParaRPr lang="en-US" sz="1200" b="0" i="0" kern="1200" dirty="0">
-              <a:solidFill>
-                <a:schemeClr val="tx1"/>
-              </a:solidFill>
-              <a:effectLst/>
-              <a:latin typeface="+mn-lt"/>
-              <a:ea typeface="+mn-ea"/>
-              <a:cs typeface="+mn-cs"/>
-            </a:endParaRPr>
+            <a:pPr defTabSz="931774">
+              <a:defRPr/>
+            </a:pPr>
+            <a:r>
+              <a:rPr lang="en-US" dirty="0" smtClean="0"/>
+              <a:t>The </a:t>
+            </a:r>
+            <a:r>
+              <a:rPr lang="en-US" dirty="0"/>
+              <a:t>mean environment satisfaction for all job roles is 2.71 in Medium-High range </a:t>
+            </a:r>
+          </a:p>
+          <a:p>
+            <a:pPr defTabSz="931774">
+              <a:defRPr/>
+            </a:pPr>
+            <a:r>
+              <a:rPr lang="en-US" dirty="0"/>
+              <a:t>Manufacturing Directors have the highest mean environment satisfaction at 2.90 with 35% reported as Very High</a:t>
+            </a:r>
+          </a:p>
+          <a:p>
+            <a:pPr defTabSz="931774">
+              <a:defRPr/>
+            </a:pPr>
+            <a:r>
+              <a:rPr lang="en-US" dirty="0"/>
+              <a:t>Research Directors have the lowest mean environment satisfaction at 2.39 with 31% reported as Low</a:t>
+            </a:r>
+          </a:p>
+          <a:p>
+            <a:pPr defTabSz="931774">
+              <a:defRPr/>
+            </a:pPr>
+            <a:r>
+              <a:rPr lang="en-US" dirty="0"/>
+              <a:t>The difference is not statistically significant at p-value 0.2330</a:t>
+            </a:r>
+            <a:r>
+              <a:rPr lang="en-US" dirty="0" smtClean="0"/>
+              <a:t>.</a:t>
+            </a:r>
+          </a:p>
+          <a:p>
+            <a:pPr defTabSz="931774">
+              <a:defRPr/>
+            </a:pPr>
+            <a:endParaRPr lang="en-US" dirty="0" smtClean="0"/>
+          </a:p>
+          <a:p>
+            <a:pPr defTabSz="931774">
+              <a:defRPr/>
+            </a:pPr>
+            <a:r>
+              <a:rPr lang="en-US" dirty="0" smtClean="0"/>
+              <a:t>So</a:t>
+            </a:r>
+            <a:r>
+              <a:rPr lang="en-US" baseline="0" dirty="0" smtClean="0"/>
+              <a:t> how about relationship satisfaction?</a:t>
+            </a:r>
+            <a:endParaRPr lang="en-US" dirty="0"/>
+          </a:p>
+          <a:p>
+            <a:endParaRPr lang="en-US" dirty="0"/>
           </a:p>
         </p:txBody>
       </p:sp>
@@ -1367,7 +1627,7 @@
           <a:p>
             <a:fld id="{1CD20D18-C2BB-4D17-BF0D-F161849BA92D}" type="slidenum">
               <a:rPr lang="en-US" smtClean="0"/>
-              <a:t>8</a:t>
+              <a:t>7</a:t>
             </a:fld>
             <a:endParaRPr lang="en-US"/>
           </a:p>
@@ -1376,7 +1636,7 @@
     </p:spTree>
     <p:extLst>
       <p:ext uri="{BB962C8B-B14F-4D97-AF65-F5344CB8AC3E}">
-        <p14:creationId xmlns:p14="http://schemas.microsoft.com/office/powerpoint/2010/main" val="935390766"/>
+        <p14:creationId xmlns:p14="http://schemas.microsoft.com/office/powerpoint/2010/main" val="3444890963"/>
       </p:ext>
     </p:extLst>
   </p:cSld>
@@ -1430,99 +1690,49 @@
           <a:bodyPr/>
           <a:lstStyle/>
           <a:p>
-            <a:pPr marL="0" marR="0" lvl="0" indent="0" algn="l" defTabSz="914400" rtl="0" eaLnBrk="1" fontAlgn="auto" latinLnBrk="0" hangingPunct="1">
-              <a:lnSpc>
-                <a:spcPct val="100000"/>
-              </a:lnSpc>
-              <a:spcBef>
-                <a:spcPts val="0"/>
-              </a:spcBef>
-              <a:spcAft>
-                <a:spcPts val="0"/>
-              </a:spcAft>
-              <a:buClrTx/>
-              <a:buSzTx/>
-              <a:buFontTx/>
-              <a:buNone/>
-              <a:tabLst/>
-              <a:defRPr/>
-            </a:pPr>
-            <a:r>
-              <a:rPr lang="en-US" sz="1200" b="0" i="0" kern="1200" dirty="0" smtClean="0">
-                <a:solidFill>
-                  <a:schemeClr val="tx1"/>
-                </a:solidFill>
-                <a:effectLst/>
-                <a:latin typeface="+mn-lt"/>
-                <a:ea typeface="+mn-ea"/>
-                <a:cs typeface="+mn-cs"/>
-              </a:rPr>
-              <a:t>55% or more of the survey responses within each job role suggest a better work life balance. </a:t>
-            </a:r>
-          </a:p>
-          <a:p>
-            <a:pPr marL="0" marR="0" lvl="0" indent="0" algn="l" defTabSz="914400" rtl="0" eaLnBrk="1" fontAlgn="auto" latinLnBrk="0" hangingPunct="1">
-              <a:lnSpc>
-                <a:spcPct val="100000"/>
-              </a:lnSpc>
-              <a:spcBef>
-                <a:spcPts val="0"/>
-              </a:spcBef>
-              <a:spcAft>
-                <a:spcPts val="0"/>
-              </a:spcAft>
-              <a:buClrTx/>
-              <a:buSzTx/>
-              <a:buFontTx/>
-              <a:buNone/>
-              <a:tabLst/>
-              <a:defRPr/>
-            </a:pPr>
-            <a:r>
-              <a:rPr lang="en-US" sz="1200" b="0" i="0" kern="1200" dirty="0" smtClean="0">
-                <a:solidFill>
-                  <a:schemeClr val="tx1"/>
-                </a:solidFill>
-                <a:effectLst/>
-                <a:latin typeface="+mn-lt"/>
-                <a:ea typeface="+mn-ea"/>
-                <a:cs typeface="+mn-cs"/>
-              </a:rPr>
-              <a:t>Human Resources personnel have the highest mean at 3.0 </a:t>
-            </a:r>
-          </a:p>
-          <a:p>
-            <a:pPr marL="0" marR="0" lvl="0" indent="0" algn="l" defTabSz="914400" rtl="0" eaLnBrk="1" fontAlgn="auto" latinLnBrk="0" hangingPunct="1">
-              <a:lnSpc>
-                <a:spcPct val="100000"/>
-              </a:lnSpc>
-              <a:spcBef>
-                <a:spcPts val="0"/>
-              </a:spcBef>
-              <a:spcAft>
-                <a:spcPts val="0"/>
-              </a:spcAft>
-              <a:buClrTx/>
-              <a:buSzTx/>
-              <a:buFontTx/>
-              <a:buNone/>
-              <a:tabLst/>
-              <a:defRPr/>
-            </a:pPr>
-            <a:r>
-              <a:rPr lang="en-US" sz="1200" b="0" i="0" kern="1200" dirty="0" smtClean="0">
-                <a:solidFill>
-                  <a:schemeClr val="tx1"/>
-                </a:solidFill>
-                <a:effectLst/>
-                <a:latin typeface="+mn-lt"/>
-                <a:ea typeface="+mn-ea"/>
-                <a:cs typeface="+mn-cs"/>
-              </a:rPr>
-              <a:t>Research Scientists with the lowest mean work life balance at 2.67.</a:t>
-            </a:r>
-          </a:p>
-          <a:p>
+            <a:r>
+              <a:rPr lang="en-US" dirty="0" smtClean="0"/>
+              <a:t>The </a:t>
+            </a:r>
+            <a:r>
+              <a:rPr lang="en-US" dirty="0"/>
+              <a:t>mean relationship satisfaction for all job roles ranged from a mean of 2.50 to 2.77</a:t>
+            </a:r>
+          </a:p>
+          <a:p>
+            <a:r>
+              <a:rPr lang="en-US" dirty="0"/>
+              <a:t>Albeit at a p-value 0.9362, the difference is not statistically significant between the roles. </a:t>
+            </a:r>
+          </a:p>
+          <a:p>
+            <a:r>
+              <a:rPr lang="en-US" dirty="0"/>
+              <a:t>Managers have the highest mean relationship satisfaction with 33% reported as Very High</a:t>
+            </a:r>
+          </a:p>
+          <a:p>
+            <a:r>
+              <a:rPr lang="en-US" dirty="0"/>
+              <a:t>Sales Representatives have the lowest mean with a reported 26% Low to and 28% </a:t>
+            </a:r>
+            <a:r>
+              <a:rPr lang="en-US" dirty="0" smtClean="0"/>
+              <a:t>High</a:t>
+            </a:r>
+          </a:p>
+          <a:p>
+            <a:endParaRPr lang="en-US" dirty="0" smtClean="0"/>
+          </a:p>
+          <a:p>
+            <a:r>
+              <a:rPr lang="en-US" dirty="0" smtClean="0"/>
+              <a:t>Lastly, what about work</a:t>
+            </a:r>
+            <a:r>
+              <a:rPr lang="en-US" baseline="0" dirty="0" smtClean="0"/>
+              <a:t> life balance by job role?</a:t>
+            </a:r>
             <a:endParaRPr lang="en-US" dirty="0"/>
           </a:p>
         </p:txBody>
@@ -1544,7 +1754,7 @@
           <a:p>
             <a:fld id="{1CD20D18-C2BB-4D17-BF0D-F161849BA92D}" type="slidenum">
               <a:rPr lang="en-US" smtClean="0"/>
-              <a:t>9</a:t>
+              <a:t>8</a:t>
             </a:fld>
             <a:endParaRPr lang="en-US"/>
           </a:p>
@@ -1553,7 +1763,7 @@
     </p:spTree>
     <p:extLst>
       <p:ext uri="{BB962C8B-B14F-4D97-AF65-F5344CB8AC3E}">
-        <p14:creationId xmlns:p14="http://schemas.microsoft.com/office/powerpoint/2010/main" val="444469977"/>
+        <p14:creationId xmlns:p14="http://schemas.microsoft.com/office/powerpoint/2010/main" val="935390766"/>
       </p:ext>
     </p:extLst>
   </p:cSld>
@@ -1607,90 +1817,55 @@
           <a:bodyPr/>
           <a:lstStyle/>
           <a:p>
-            <a:r>
-              <a:rPr lang="en-US" sz="1200" b="0" i="0" kern="1200" dirty="0" smtClean="0">
-                <a:solidFill>
-                  <a:schemeClr val="tx1"/>
-                </a:solidFill>
-                <a:effectLst/>
-                <a:latin typeface="+mn-lt"/>
-                <a:ea typeface="+mn-ea"/>
-                <a:cs typeface="+mn-cs"/>
-              </a:rPr>
-              <a:t>With an 87.3% overall accuracy, our custom regression model identified 11 factors contribute to turnover. </a:t>
-            </a:r>
-          </a:p>
-          <a:p>
-            <a:r>
-              <a:rPr lang="en-US" sz="1200" b="0" i="0" kern="1200" dirty="0" smtClean="0">
-                <a:solidFill>
-                  <a:schemeClr val="tx1"/>
-                </a:solidFill>
-                <a:effectLst/>
-                <a:latin typeface="+mn-lt"/>
-                <a:ea typeface="+mn-ea"/>
-                <a:cs typeface="+mn-cs"/>
-              </a:rPr>
-              <a:t>Job</a:t>
-            </a:r>
-            <a:r>
-              <a:rPr lang="en-US" sz="1200" b="0" i="0" kern="1200" baseline="0" dirty="0" smtClean="0">
-                <a:solidFill>
-                  <a:schemeClr val="tx1"/>
-                </a:solidFill>
-                <a:effectLst/>
-                <a:latin typeface="+mn-lt"/>
-                <a:ea typeface="+mn-ea"/>
-                <a:cs typeface="+mn-cs"/>
-              </a:rPr>
-              <a:t> Involvement was the only variable that overlapped with our preliminary analysis</a:t>
-            </a:r>
-          </a:p>
-          <a:p>
-            <a:r>
-              <a:rPr lang="en-US" sz="1200" b="0" i="0" kern="1200" baseline="0" dirty="0" smtClean="0">
-                <a:solidFill>
-                  <a:schemeClr val="tx1"/>
-                </a:solidFill>
-                <a:effectLst/>
-                <a:latin typeface="+mn-lt"/>
-                <a:ea typeface="+mn-ea"/>
-                <a:cs typeface="+mn-cs"/>
-              </a:rPr>
-              <a:t>Relationship Satisfaction and Environment Satisfaction while not by themselves are significant with Job Role, the are contributing factors to turnover in conjunction with the other variables</a:t>
-            </a:r>
-            <a:endParaRPr lang="en-US" sz="1200" b="0" i="0" kern="1200" dirty="0" smtClean="0">
-              <a:solidFill>
-                <a:schemeClr val="tx1"/>
-              </a:solidFill>
-              <a:effectLst/>
-              <a:latin typeface="+mn-lt"/>
-              <a:ea typeface="+mn-ea"/>
-              <a:cs typeface="+mn-cs"/>
-            </a:endParaRPr>
-          </a:p>
-          <a:p>
-            <a:r>
-              <a:rPr lang="en-US" sz="1200" b="0" i="0" kern="1200" dirty="0" smtClean="0">
-                <a:solidFill>
-                  <a:schemeClr val="tx1"/>
-                </a:solidFill>
-                <a:effectLst/>
-                <a:latin typeface="+mn-lt"/>
-                <a:ea typeface="+mn-ea"/>
-                <a:cs typeface="+mn-cs"/>
-              </a:rPr>
-              <a:t>Managing these factors in developing and retaining employees could reduce and prevent attrition.</a:t>
-            </a:r>
-            <a:endParaRPr lang="en-US" sz="1200" b="0" i="0" kern="1200" dirty="0">
-              <a:solidFill>
-                <a:schemeClr val="tx1"/>
-              </a:solidFill>
-              <a:effectLst/>
-              <a:latin typeface="+mn-lt"/>
-              <a:ea typeface="+mn-ea"/>
-              <a:cs typeface="+mn-cs"/>
-            </a:endParaRPr>
+            <a:pPr defTabSz="931774">
+              <a:defRPr/>
+            </a:pPr>
+            <a:r>
+              <a:rPr lang="en-US" dirty="0"/>
+              <a:t>55% or more of the survey responses within each job role reported a better work life balance. </a:t>
+            </a:r>
+          </a:p>
+          <a:p>
+            <a:pPr defTabSz="931774">
+              <a:defRPr/>
+            </a:pPr>
+            <a:r>
+              <a:rPr lang="en-US" dirty="0"/>
+              <a:t>Human Resources personnel have the highest mean at 3.0 </a:t>
+            </a:r>
+          </a:p>
+          <a:p>
+            <a:pPr defTabSz="931774">
+              <a:defRPr/>
+            </a:pPr>
+            <a:r>
+              <a:rPr lang="en-US" dirty="0"/>
+              <a:t>Research Scientists with the lowest mean work life balance at 2.67.</a:t>
+            </a:r>
+          </a:p>
+          <a:p>
+            <a:pPr defTabSz="931774">
+              <a:defRPr/>
+            </a:pPr>
+            <a:r>
+              <a:rPr lang="en-US" dirty="0" smtClean="0"/>
+              <a:t>Given the lack</a:t>
+            </a:r>
+            <a:r>
+              <a:rPr lang="en-US" baseline="0" dirty="0" smtClean="0"/>
+              <a:t> of evidence for statistical significance with job roles,</a:t>
+            </a:r>
+            <a:r>
+              <a:rPr lang="en-US" dirty="0" smtClean="0"/>
+              <a:t> </a:t>
+            </a:r>
+            <a:r>
+              <a:rPr lang="en-US" dirty="0"/>
+              <a:t>do any of these four variables contribute to our prediction model?</a:t>
+            </a:r>
+          </a:p>
+          <a:p>
+            <a:endParaRPr lang="en-US" dirty="0"/>
           </a:p>
         </p:txBody>
       </p:sp>
@@ -1711,7 +1886,7 @@
           <a:p>
             <a:fld id="{1CD20D18-C2BB-4D17-BF0D-F161849BA92D}" type="slidenum">
               <a:rPr lang="en-US" smtClean="0"/>
-              <a:t>10</a:t>
+              <a:t>9</a:t>
             </a:fld>
             <a:endParaRPr lang="en-US"/>
           </a:p>
@@ -1720,7 +1895,7 @@
     </p:spTree>
     <p:extLst>
       <p:ext uri="{BB962C8B-B14F-4D97-AF65-F5344CB8AC3E}">
-        <p14:creationId xmlns:p14="http://schemas.microsoft.com/office/powerpoint/2010/main" val="1488775007"/>
+        <p14:creationId xmlns:p14="http://schemas.microsoft.com/office/powerpoint/2010/main" val="444469977"/>
       </p:ext>
     </p:extLst>
   </p:cSld>
@@ -1976,7 +2151,7 @@
             <a:fld id="{B61BEF0D-F0BB-DE4B-95CE-6DB70DBA9567}" type="datetimeFigureOut">
               <a:rPr lang="en-US" smtClean="0"/>
               <a:pPr/>
-              <a:t>12/5/2018</a:t>
+              <a:t>12/9/2018</a:t>
             </a:fld>
             <a:endParaRPr lang="en-US" dirty="0"/>
           </a:p>
@@ -2240,7 +2415,7 @@
             <a:fld id="{B61BEF0D-F0BB-DE4B-95CE-6DB70DBA9567}" type="datetimeFigureOut">
               <a:rPr lang="en-US" smtClean="0"/>
               <a:pPr/>
-              <a:t>12/5/2018</a:t>
+              <a:t>12/9/2018</a:t>
             </a:fld>
             <a:endParaRPr lang="en-US" dirty="0"/>
           </a:p>
@@ -2477,7 +2652,7 @@
             <a:fld id="{B61BEF0D-F0BB-DE4B-95CE-6DB70DBA9567}" type="datetimeFigureOut">
               <a:rPr lang="en-US" smtClean="0"/>
               <a:pPr/>
-              <a:t>12/5/2018</a:t>
+              <a:t>12/9/2018</a:t>
             </a:fld>
             <a:endParaRPr lang="en-US" dirty="0"/>
           </a:p>
@@ -2719,7 +2894,7 @@
             <a:fld id="{B61BEF0D-F0BB-DE4B-95CE-6DB70DBA9567}" type="datetimeFigureOut">
               <a:rPr lang="en-US" smtClean="0"/>
               <a:pPr/>
-              <a:t>12/5/2018</a:t>
+              <a:t>12/9/2018</a:t>
             </a:fld>
             <a:endParaRPr lang="en-US" dirty="0"/>
           </a:p>
@@ -3028,7 +3203,7 @@
             <a:fld id="{B61BEF0D-F0BB-DE4B-95CE-6DB70DBA9567}" type="datetimeFigureOut">
               <a:rPr lang="en-US" smtClean="0"/>
               <a:pPr/>
-              <a:t>12/5/2018</a:t>
+              <a:t>12/9/2018</a:t>
             </a:fld>
             <a:endParaRPr lang="en-US" dirty="0"/>
           </a:p>
@@ -3332,7 +3507,7 @@
             <a:fld id="{B61BEF0D-F0BB-DE4B-95CE-6DB70DBA9567}" type="datetimeFigureOut">
               <a:rPr lang="en-US" smtClean="0"/>
               <a:pPr/>
-              <a:t>12/5/2018</a:t>
+              <a:t>12/9/2018</a:t>
             </a:fld>
             <a:endParaRPr lang="en-US" dirty="0"/>
           </a:p>
@@ -3756,7 +3931,7 @@
             <a:fld id="{B61BEF0D-F0BB-DE4B-95CE-6DB70DBA9567}" type="datetimeFigureOut">
               <a:rPr lang="en-US" smtClean="0"/>
               <a:pPr/>
-              <a:t>12/5/2018</a:t>
+              <a:t>12/9/2018</a:t>
             </a:fld>
             <a:endParaRPr lang="en-US" dirty="0"/>
           </a:p>
@@ -3853,7 +4028,7 @@
             <a:fld id="{B61BEF0D-F0BB-DE4B-95CE-6DB70DBA9567}" type="datetimeFigureOut">
               <a:rPr lang="en-US" smtClean="0"/>
               <a:pPr/>
-              <a:t>12/5/2018</a:t>
+              <a:t>12/9/2018</a:t>
             </a:fld>
             <a:endParaRPr lang="en-US" dirty="0"/>
           </a:p>
@@ -4017,7 +4192,7 @@
             <a:fld id="{B61BEF0D-F0BB-DE4B-95CE-6DB70DBA9567}" type="datetimeFigureOut">
               <a:rPr lang="en-US" smtClean="0"/>
               <a:pPr/>
-              <a:t>12/5/2018</a:t>
+              <a:t>12/9/2018</a:t>
             </a:fld>
             <a:endParaRPr lang="en-US" dirty="0"/>
           </a:p>
@@ -4397,7 +4572,7 @@
             <a:fld id="{B61BEF0D-F0BB-DE4B-95CE-6DB70DBA9567}" type="datetimeFigureOut">
               <a:rPr lang="en-US" smtClean="0"/>
               <a:pPr/>
-              <a:t>12/5/2018</a:t>
+              <a:t>12/9/2018</a:t>
             </a:fld>
             <a:endParaRPr lang="en-US" dirty="0"/>
           </a:p>
@@ -4688,7 +4863,7 @@
             <a:fld id="{B61BEF0D-F0BB-DE4B-95CE-6DB70DBA9567}" type="datetimeFigureOut">
               <a:rPr lang="en-US" smtClean="0"/>
               <a:pPr/>
-              <a:t>12/5/2018</a:t>
+              <a:t>12/9/2018</a:t>
             </a:fld>
             <a:endParaRPr lang="en-US" dirty="0"/>
           </a:p>
@@ -4901,7 +5076,7 @@
             <a:fld id="{B61BEF0D-F0BB-DE4B-95CE-6DB70DBA9567}" type="datetimeFigureOut">
               <a:rPr lang="en-US" smtClean="0"/>
               <a:pPr/>
-              <a:t>12/5/2018</a:t>
+              <a:t>12/9/2018</a:t>
             </a:fld>
             <a:endParaRPr lang="en-US" dirty="0"/>
           </a:p>
@@ -5547,11 +5722,7 @@
             </a:r>
             <a:r>
               <a:rPr lang="en-US" dirty="0" smtClean="0"/>
-              <a:t> 6306-404 Case study </a:t>
-            </a:r>
-            <a:r>
-              <a:rPr lang="en-US" dirty="0" smtClean="0"/>
-              <a:t>2</a:t>
+              <a:t> 6306-404 Case study 2</a:t>
             </a:r>
             <a:endParaRPr lang="en-US" dirty="0"/>
           </a:p>
@@ -5611,7 +5782,7 @@
           <a:p>
             <a:r>
               <a:rPr lang="en-US" dirty="0" smtClean="0"/>
-              <a:t>CUSTOM Prediction model</a:t>
+              <a:t>LOGISTIC REGRESSION MODEL</a:t>
             </a:r>
             <a:endParaRPr lang="en-US" dirty="0"/>
           </a:p>
@@ -5627,14 +5798,14 @@
             <p:ph sz="half" idx="1"/>
             <p:extLst>
               <p:ext uri="{D42A27DB-BD31-4B8C-83A1-F6EECF244321}">
-                <p14:modId xmlns:p14="http://schemas.microsoft.com/office/powerpoint/2010/main" val="4008477863"/>
+                <p14:modId xmlns:p14="http://schemas.microsoft.com/office/powerpoint/2010/main" val="1335179598"/>
               </p:ext>
             </p:extLst>
           </p:nvPr>
         </p:nvGraphicFramePr>
         <p:xfrm>
-          <a:off x="581193" y="2046505"/>
-          <a:ext cx="4870483" cy="3983904"/>
+          <a:off x="581194" y="2046505"/>
+          <a:ext cx="4703187" cy="3651912"/>
         </p:xfrm>
         <a:graphic>
           <a:graphicData uri="http://schemas.openxmlformats.org/drawingml/2006/table">
@@ -5643,8 +5814,9 @@
                 <a:tableStyleId>{5C22544A-7EE6-4342-B048-85BDC9FD1C3A}</a:tableStyleId>
               </a:tblPr>
               <a:tblGrid>
-                <a:gridCol w="719250"/>
-                <a:gridCol w="4151233"/>
+                <a:gridCol w="630918"/>
+                <a:gridCol w="2775097"/>
+                <a:gridCol w="1297172"/>
               </a:tblGrid>
               <a:tr h="331992">
                 <a:tc>
@@ -5667,6 +5839,20 @@
                   </a:txBody>
                   <a:tcPr marL="110923" marR="110923"/>
                 </a:tc>
+                <a:tc>
+                  <a:txBody>
+                    <a:bodyPr/>
+                    <a:lstStyle/>
+                    <a:p>
+                      <a:r>
+                        <a:rPr lang="en-US" sz="1200" dirty="0" smtClean="0"/>
+                        <a:t>Significance </a:t>
+                      </a:r>
+                      <a:endParaRPr lang="en-US" sz="1200" dirty="0"/>
+                    </a:p>
+                  </a:txBody>
+                  <a:tcPr marL="110923" marR="110923"/>
+                </a:tc>
               </a:tr>
               <a:tr h="331992">
                 <a:tc>
@@ -5697,6 +5883,20 @@
                   </a:txBody>
                   <a:tcPr marL="110923" marR="110923"/>
                 </a:tc>
+                <a:tc>
+                  <a:txBody>
+                    <a:bodyPr/>
+                    <a:lstStyle/>
+                    <a:p>
+                      <a:r>
+                        <a:rPr lang="en-US" sz="1200" dirty="0" smtClean="0"/>
+                        <a:t>***</a:t>
+                      </a:r>
+                      <a:endParaRPr lang="en-US" sz="1200" dirty="0"/>
+                    </a:p>
+                  </a:txBody>
+                  <a:tcPr marL="110923" marR="110923"/>
+                </a:tc>
               </a:tr>
               <a:tr h="331992">
                 <a:tc>
@@ -5718,15 +5918,87 @@
                     <a:bodyPr/>
                     <a:lstStyle/>
                     <a:p>
-                      <a:r>
-                        <a:rPr lang="en-US" sz="1200" dirty="0" smtClean="0"/>
-                        <a:t>Commute Distance</a:t>
-                      </a:r>
-                      <a:r>
-                        <a:rPr lang="en-US" sz="1200" baseline="0" dirty="0" smtClean="0"/>
-                        <a:t> from Home</a:t>
-                      </a:r>
-                      <a:endParaRPr lang="en-US" sz="1200" dirty="0"/>
+                      <a:pPr marL="0" marR="0" lvl="0" indent="0" algn="l" defTabSz="457200" rtl="0" eaLnBrk="1" fontAlgn="auto" latinLnBrk="0" hangingPunct="1">
+                        <a:lnSpc>
+                          <a:spcPct val="100000"/>
+                        </a:lnSpc>
+                        <a:spcBef>
+                          <a:spcPts val="0"/>
+                        </a:spcBef>
+                        <a:spcAft>
+                          <a:spcPts val="0"/>
+                        </a:spcAft>
+                        <a:buClrTx/>
+                        <a:buSzTx/>
+                        <a:buFontTx/>
+                        <a:buNone/>
+                        <a:tabLst/>
+                        <a:defRPr/>
+                      </a:pPr>
+                      <a:r>
+                        <a:rPr lang="en-US" sz="1200" b="1" u="sng" dirty="0" smtClean="0">
+                          <a:solidFill>
+                            <a:schemeClr val="accent1">
+                              <a:lumMod val="60000"/>
+                              <a:lumOff val="40000"/>
+                            </a:schemeClr>
+                          </a:solidFill>
+                        </a:rPr>
+                        <a:t>Environment</a:t>
+                      </a:r>
+                      <a:r>
+                        <a:rPr lang="en-US" sz="1200" b="1" u="sng" baseline="0" dirty="0" smtClean="0">
+                          <a:solidFill>
+                            <a:schemeClr val="accent1">
+                              <a:lumMod val="60000"/>
+                              <a:lumOff val="40000"/>
+                            </a:schemeClr>
+                          </a:solidFill>
+                        </a:rPr>
+                        <a:t> Satisfaction</a:t>
+                      </a:r>
+                      <a:endParaRPr lang="en-US" sz="1200" b="1" u="sng" dirty="0" smtClean="0">
+                        <a:solidFill>
+                          <a:schemeClr val="accent1">
+                            <a:lumMod val="60000"/>
+                            <a:lumOff val="40000"/>
+                          </a:schemeClr>
+                        </a:solidFill>
+                      </a:endParaRPr>
+                    </a:p>
+                  </a:txBody>
+                  <a:tcPr marL="110923" marR="110923"/>
+                </a:tc>
+                <a:tc>
+                  <a:txBody>
+                    <a:bodyPr/>
+                    <a:lstStyle/>
+                    <a:p>
+                      <a:pPr marL="0" marR="0" lvl="0" indent="0" algn="l" defTabSz="457200" rtl="0" eaLnBrk="1" fontAlgn="auto" latinLnBrk="0" hangingPunct="1">
+                        <a:lnSpc>
+                          <a:spcPct val="100000"/>
+                        </a:lnSpc>
+                        <a:spcBef>
+                          <a:spcPts val="0"/>
+                        </a:spcBef>
+                        <a:spcAft>
+                          <a:spcPts val="0"/>
+                        </a:spcAft>
+                        <a:buClrTx/>
+                        <a:buSzTx/>
+                        <a:buFontTx/>
+                        <a:buNone/>
+                        <a:tabLst/>
+                        <a:defRPr/>
+                      </a:pPr>
+                      <a:r>
+                        <a:rPr lang="en-US" sz="1200" b="0" u="none" dirty="0" smtClean="0">
+                          <a:solidFill>
+                            <a:schemeClr val="tx1"/>
+                          </a:solidFill>
+                        </a:rPr>
+                        <a:t>***</a:t>
+                      </a:r>
                     </a:p>
                   </a:txBody>
                   <a:tcPr marL="110923" marR="110923"/>
@@ -5769,6 +6041,40 @@
                   </a:txBody>
                   <a:tcPr marL="110923" marR="110923"/>
                 </a:tc>
+                <a:tc>
+                  <a:txBody>
+                    <a:bodyPr/>
+                    <a:lstStyle/>
+                    <a:p>
+                      <a:pPr marL="0" marR="0" lvl="0" indent="0" algn="l" defTabSz="457200" rtl="0" eaLnBrk="1" fontAlgn="auto" latinLnBrk="0" hangingPunct="1">
+                        <a:lnSpc>
+                          <a:spcPct val="100000"/>
+                        </a:lnSpc>
+                        <a:spcBef>
+                          <a:spcPts val="0"/>
+                        </a:spcBef>
+                        <a:spcAft>
+                          <a:spcPts val="0"/>
+                        </a:spcAft>
+                        <a:buClrTx/>
+                        <a:buSzTx/>
+                        <a:buFontTx/>
+                        <a:buNone/>
+                        <a:tabLst/>
+                        <a:defRPr/>
+                      </a:pPr>
+                      <a:r>
+                        <a:rPr lang="en-US" sz="1200" b="0" u="none" dirty="0" smtClean="0">
+                          <a:solidFill>
+                            <a:schemeClr val="tx1"/>
+                          </a:solidFill>
+                        </a:rPr>
+                        <a:t>***</a:t>
+                      </a:r>
+                    </a:p>
+                  </a:txBody>
+                  <a:tcPr marL="110923" marR="110923"/>
+                </a:tc>
               </a:tr>
               <a:tr h="331992">
                 <a:tc>
@@ -5790,6 +6096,229 @@
                     <a:bodyPr/>
                     <a:lstStyle/>
                     <a:p>
+                      <a:pPr marL="0" marR="0" lvl="0" indent="0" algn="l" defTabSz="457200" rtl="0" eaLnBrk="1" fontAlgn="auto" latinLnBrk="0" hangingPunct="1">
+                        <a:lnSpc>
+                          <a:spcPct val="100000"/>
+                        </a:lnSpc>
+                        <a:spcBef>
+                          <a:spcPts val="0"/>
+                        </a:spcBef>
+                        <a:spcAft>
+                          <a:spcPts val="0"/>
+                        </a:spcAft>
+                        <a:buClrTx/>
+                        <a:buSzTx/>
+                        <a:buFontTx/>
+                        <a:buNone/>
+                        <a:tabLst/>
+                        <a:defRPr/>
+                      </a:pPr>
+                      <a:r>
+                        <a:rPr lang="en-US" sz="1200" b="1" u="sng" dirty="0" smtClean="0">
+                          <a:solidFill>
+                            <a:schemeClr val="accent1">
+                              <a:lumMod val="60000"/>
+                              <a:lumOff val="40000"/>
+                            </a:schemeClr>
+                          </a:solidFill>
+                        </a:rPr>
+                        <a:t>Job Satisfaction</a:t>
+                      </a:r>
+                    </a:p>
+                  </a:txBody>
+                  <a:tcPr marL="110923" marR="110923"/>
+                </a:tc>
+                <a:tc>
+                  <a:txBody>
+                    <a:bodyPr/>
+                    <a:lstStyle/>
+                    <a:p>
+                      <a:pPr marL="0" marR="0" lvl="0" indent="0" algn="l" defTabSz="457200" rtl="0" eaLnBrk="1" fontAlgn="auto" latinLnBrk="0" hangingPunct="1">
+                        <a:lnSpc>
+                          <a:spcPct val="100000"/>
+                        </a:lnSpc>
+                        <a:spcBef>
+                          <a:spcPts val="0"/>
+                        </a:spcBef>
+                        <a:spcAft>
+                          <a:spcPts val="0"/>
+                        </a:spcAft>
+                        <a:buClrTx/>
+                        <a:buSzTx/>
+                        <a:buFontTx/>
+                        <a:buNone/>
+                        <a:tabLst/>
+                        <a:defRPr/>
+                      </a:pPr>
+                      <a:r>
+                        <a:rPr lang="en-US" sz="1200" b="0" u="none" dirty="0" smtClean="0">
+                          <a:solidFill>
+                            <a:schemeClr val="tx1"/>
+                          </a:solidFill>
+                        </a:rPr>
+                        <a:t>***</a:t>
+                      </a:r>
+                    </a:p>
+                  </a:txBody>
+                  <a:tcPr marL="110923" marR="110923"/>
+                </a:tc>
+              </a:tr>
+              <a:tr h="331992">
+                <a:tc>
+                  <a:txBody>
+                    <a:bodyPr/>
+                    <a:lstStyle/>
+                    <a:p>
+                      <a:r>
+                        <a:rPr lang="en-US" sz="1200" dirty="0" smtClean="0"/>
+                        <a:t>5</a:t>
+                      </a:r>
+                      <a:endParaRPr lang="en-US" sz="1200" dirty="0"/>
+                    </a:p>
+                  </a:txBody>
+                  <a:tcPr marL="110923" marR="110923"/>
+                </a:tc>
+                <a:tc>
+                  <a:txBody>
+                    <a:bodyPr/>
+                    <a:lstStyle/>
+                    <a:p>
+                      <a:r>
+                        <a:rPr lang="en-US" sz="1200" dirty="0" smtClean="0"/>
+                        <a:t>Number of Companies Worked</a:t>
+                      </a:r>
+                      <a:endParaRPr lang="en-US" sz="1200" dirty="0"/>
+                    </a:p>
+                  </a:txBody>
+                  <a:tcPr marL="110923" marR="110923"/>
+                </a:tc>
+                <a:tc>
+                  <a:txBody>
+                    <a:bodyPr/>
+                    <a:lstStyle/>
+                    <a:p>
+                      <a:r>
+                        <a:rPr lang="en-US" sz="1200" dirty="0" smtClean="0"/>
+                        <a:t>***</a:t>
+                      </a:r>
+                      <a:endParaRPr lang="en-US" sz="1200" dirty="0"/>
+                    </a:p>
+                  </a:txBody>
+                  <a:tcPr marL="110923" marR="110923"/>
+                </a:tc>
+              </a:tr>
+              <a:tr h="331992">
+                <a:tc>
+                  <a:txBody>
+                    <a:bodyPr/>
+                    <a:lstStyle/>
+                    <a:p>
+                      <a:r>
+                        <a:rPr lang="en-US" sz="1200" dirty="0" smtClean="0"/>
+                        <a:t>6</a:t>
+                      </a:r>
+                      <a:endParaRPr lang="en-US" sz="1200" dirty="0"/>
+                    </a:p>
+                  </a:txBody>
+                  <a:tcPr marL="110923" marR="110923"/>
+                </a:tc>
+                <a:tc>
+                  <a:txBody>
+                    <a:bodyPr/>
+                    <a:lstStyle/>
+                    <a:p>
+                      <a:r>
+                        <a:rPr lang="en-US" sz="1200" dirty="0" smtClean="0"/>
+                        <a:t>Overtime</a:t>
+                      </a:r>
+                      <a:endParaRPr lang="en-US" sz="1200" dirty="0"/>
+                    </a:p>
+                  </a:txBody>
+                  <a:tcPr marL="110923" marR="110923"/>
+                </a:tc>
+                <a:tc>
+                  <a:txBody>
+                    <a:bodyPr/>
+                    <a:lstStyle/>
+                    <a:p>
+                      <a:r>
+                        <a:rPr lang="en-US" sz="1200" dirty="0" smtClean="0"/>
+                        <a:t>***</a:t>
+                      </a:r>
+                      <a:endParaRPr lang="en-US" sz="1200" dirty="0"/>
+                    </a:p>
+                  </a:txBody>
+                  <a:tcPr marL="110923" marR="110923"/>
+                </a:tc>
+              </a:tr>
+              <a:tr h="331992">
+                <a:tc>
+                  <a:txBody>
+                    <a:bodyPr/>
+                    <a:lstStyle/>
+                    <a:p>
+                      <a:r>
+                        <a:rPr lang="en-US" sz="1200" dirty="0" smtClean="0"/>
+                        <a:t>7</a:t>
+                      </a:r>
+                      <a:endParaRPr lang="en-US" sz="1200" dirty="0"/>
+                    </a:p>
+                  </a:txBody>
+                  <a:tcPr marL="110923" marR="110923"/>
+                </a:tc>
+                <a:tc>
+                  <a:txBody>
+                    <a:bodyPr/>
+                    <a:lstStyle/>
+                    <a:p>
+                      <a:r>
+                        <a:rPr lang="en-US" sz="1200" dirty="0" smtClean="0"/>
+                        <a:t>Commute Distance</a:t>
+                      </a:r>
+                      <a:r>
+                        <a:rPr lang="en-US" sz="1200" baseline="0" dirty="0" smtClean="0"/>
+                        <a:t> from Home</a:t>
+                      </a:r>
+                      <a:endParaRPr lang="en-US" sz="1200" dirty="0"/>
+                    </a:p>
+                  </a:txBody>
+                  <a:tcPr marL="110923" marR="110923"/>
+                </a:tc>
+                <a:tc>
+                  <a:txBody>
+                    <a:bodyPr/>
+                    <a:lstStyle/>
+                    <a:p>
+                      <a:r>
+                        <a:rPr lang="en-US" sz="1200" dirty="0" smtClean="0"/>
+                        <a:t>**</a:t>
+                      </a:r>
+                      <a:endParaRPr lang="en-US" sz="1200" dirty="0"/>
+                    </a:p>
+                  </a:txBody>
+                  <a:tcPr marL="110923" marR="110923"/>
+                </a:tc>
+              </a:tr>
+              <a:tr h="331992">
+                <a:tc>
+                  <a:txBody>
+                    <a:bodyPr/>
+                    <a:lstStyle/>
+                    <a:p>
+                      <a:r>
+                        <a:rPr lang="en-US" sz="1200" dirty="0" smtClean="0"/>
+                        <a:t>8</a:t>
+                      </a:r>
+                      <a:endParaRPr lang="en-US" sz="1200" dirty="0"/>
+                    </a:p>
+                  </a:txBody>
+                  <a:tcPr marL="110923" marR="110923"/>
+                </a:tc>
+                <a:tc>
+                  <a:txBody>
+                    <a:bodyPr/>
+                    <a:lstStyle/>
+                    <a:p>
                       <a:r>
                         <a:rPr lang="en-US" sz="1200" dirty="0" smtClean="0"/>
                         <a:t>Job Role</a:t>
@@ -5799,6 +6328,20 @@
                   </a:txBody>
                   <a:tcPr marL="110923" marR="110923"/>
                 </a:tc>
+                <a:tc>
+                  <a:txBody>
+                    <a:bodyPr/>
+                    <a:lstStyle/>
+                    <a:p>
+                      <a:r>
+                        <a:rPr lang="en-US" sz="1200" dirty="0" smtClean="0"/>
+                        <a:t>0.1 to ***</a:t>
+                      </a:r>
+                      <a:endParaRPr lang="en-US" sz="1200" dirty="0"/>
+                    </a:p>
+                  </a:txBody>
+                  <a:tcPr marL="110923" marR="110923"/>
+                </a:tc>
               </a:tr>
               <a:tr h="331992">
                 <a:tc>
@@ -5808,7 +6351,7 @@
                     <a:p>
                       <a:r>
                         <a:rPr lang="en-US" sz="1200" dirty="0" smtClean="0"/>
-                        <a:t>5</a:t>
+                        <a:t>9</a:t>
                       </a:r>
                       <a:endParaRPr lang="en-US" sz="1200" dirty="0"/>
                     </a:p>
@@ -5833,8 +6376,6 @@
                   </a:txBody>
                   <a:tcPr marL="110923" marR="110923"/>
                 </a:tc>
-              </a:tr>
-              <a:tr h="331992">
                 <a:tc>
                   <a:txBody>
                     <a:bodyPr/>
@@ -5842,119 +6383,7 @@
                     <a:p>
                       <a:r>
                         <a:rPr lang="en-US" sz="1200" dirty="0" smtClean="0"/>
-                        <a:t>6</a:t>
-                      </a:r>
-                      <a:endParaRPr lang="en-US" sz="1200" dirty="0"/>
-                    </a:p>
-                  </a:txBody>
-                  <a:tcPr marL="110923" marR="110923"/>
-                </a:tc>
-                <a:tc>
-                  <a:txBody>
-                    <a:bodyPr/>
-                    <a:lstStyle/>
-                    <a:p>
-                      <a:r>
-                        <a:rPr lang="en-US" sz="1200" dirty="0" smtClean="0"/>
-                        <a:t>Number of Companies Worked</a:t>
-                      </a:r>
-                      <a:endParaRPr lang="en-US" sz="1200" dirty="0"/>
-                    </a:p>
-                  </a:txBody>
-                  <a:tcPr marL="110923" marR="110923"/>
-                </a:tc>
-              </a:tr>
-              <a:tr h="331992">
-                <a:tc>
-                  <a:txBody>
-                    <a:bodyPr/>
-                    <a:lstStyle/>
-                    <a:p>
-                      <a:r>
-                        <a:rPr lang="en-US" sz="1200" dirty="0" smtClean="0"/>
-                        <a:t>7</a:t>
-                      </a:r>
-                      <a:endParaRPr lang="en-US" sz="1200" dirty="0"/>
-                    </a:p>
-                  </a:txBody>
-                  <a:tcPr marL="110923" marR="110923"/>
-                </a:tc>
-                <a:tc>
-                  <a:txBody>
-                    <a:bodyPr/>
-                    <a:lstStyle/>
-                    <a:p>
-                      <a:r>
-                        <a:rPr lang="en-US" sz="1200" dirty="0" smtClean="0"/>
-                        <a:t>Overtime</a:t>
-                      </a:r>
-                      <a:endParaRPr lang="en-US" sz="1200" dirty="0"/>
-                    </a:p>
-                  </a:txBody>
-                  <a:tcPr marL="110923" marR="110923"/>
-                </a:tc>
-              </a:tr>
-              <a:tr h="331992">
-                <a:tc>
-                  <a:txBody>
-                    <a:bodyPr/>
-                    <a:lstStyle/>
-                    <a:p>
-                      <a:r>
-                        <a:rPr lang="en-US" sz="1200" dirty="0" smtClean="0"/>
-                        <a:t>8</a:t>
-                      </a:r>
-                      <a:endParaRPr lang="en-US" sz="1200" dirty="0"/>
-                    </a:p>
-                  </a:txBody>
-                  <a:tcPr marL="110923" marR="110923"/>
-                </a:tc>
-                <a:tc>
-                  <a:txBody>
-                    <a:bodyPr/>
-                    <a:lstStyle/>
-                    <a:p>
-                      <a:r>
-                        <a:rPr lang="en-US" sz="1200" dirty="0" smtClean="0"/>
-                        <a:t>Years</a:t>
-                      </a:r>
-                      <a:r>
-                        <a:rPr lang="en-US" sz="1200" baseline="0" dirty="0" smtClean="0"/>
-                        <a:t> at Company</a:t>
-                      </a:r>
-                      <a:endParaRPr lang="en-US" sz="1200" dirty="0"/>
-                    </a:p>
-                  </a:txBody>
-                  <a:tcPr marL="110923" marR="110923"/>
-                </a:tc>
-              </a:tr>
-              <a:tr h="331992">
-                <a:tc>
-                  <a:txBody>
-                    <a:bodyPr/>
-                    <a:lstStyle/>
-                    <a:p>
-                      <a:r>
-                        <a:rPr lang="en-US" sz="1200" dirty="0" smtClean="0"/>
-                        <a:t>9</a:t>
-                      </a:r>
-                      <a:endParaRPr lang="en-US" sz="1200" dirty="0"/>
-                    </a:p>
-                  </a:txBody>
-                  <a:tcPr marL="110923" marR="110923"/>
-                </a:tc>
-                <a:tc>
-                  <a:txBody>
-                    <a:bodyPr/>
-                    <a:lstStyle/>
-                    <a:p>
-                      <a:r>
-                        <a:rPr lang="en-US" sz="1200" dirty="0" smtClean="0"/>
-                        <a:t>Years Since</a:t>
-                      </a:r>
-                      <a:r>
-                        <a:rPr lang="en-US" sz="1200" baseline="0" dirty="0" smtClean="0"/>
-                        <a:t> Last Promotion</a:t>
+                        <a:t>0.1 to ***</a:t>
                       </a:r>
                       <a:endParaRPr lang="en-US" sz="1200" dirty="0"/>
                     </a:p>
@@ -6005,48 +6434,18 @@
                   </a:txBody>
                   <a:tcPr marL="110923" marR="110923"/>
                 </a:tc>
-              </a:tr>
-              <a:tr h="331992">
-                <a:tc>
-                  <a:txBody>
-                    <a:bodyPr/>
-                    <a:lstStyle/>
-                    <a:p>
-                      <a:r>
-                        <a:rPr lang="en-US" sz="1200" dirty="0" smtClean="0"/>
-                        <a:t>11</a:t>
-                      </a:r>
-                      <a:endParaRPr lang="en-US" sz="1200" dirty="0"/>
-                    </a:p>
-                  </a:txBody>
-                  <a:tcPr marL="110923" marR="110923"/>
-                </a:tc>
-                <a:tc>
-                  <a:txBody>
-                    <a:bodyPr/>
-                    <a:lstStyle/>
-                    <a:p>
-                      <a:r>
-                        <a:rPr lang="en-US" sz="1200" b="1" u="sng" dirty="0" smtClean="0">
+                <a:tc>
+                  <a:txBody>
+                    <a:bodyPr/>
+                    <a:lstStyle/>
+                    <a:p>
+                      <a:r>
+                        <a:rPr lang="en-US" sz="1200" b="0" u="none" dirty="0" smtClean="0">
                           <a:solidFill>
-                            <a:schemeClr val="accent1">
-                              <a:lumMod val="60000"/>
-                              <a:lumOff val="40000"/>
-                            </a:schemeClr>
+                            <a:schemeClr val="dk1"/>
                           </a:solidFill>
                         </a:rPr>
-                        <a:t>Environment</a:t>
-                      </a:r>
-                      <a:r>
-                        <a:rPr lang="en-US" sz="1200" b="1" u="sng" baseline="0" dirty="0" smtClean="0">
-                          <a:solidFill>
-                            <a:schemeClr val="accent1">
-                              <a:lumMod val="60000"/>
-                              <a:lumOff val="40000"/>
-                            </a:schemeClr>
-                          </a:solidFill>
-                        </a:rPr>
-                        <a:t> Satisfaction</a:t>
+                        <a:t>0.05</a:t>
                       </a:r>
                       <a:endParaRPr lang="en-US" sz="1200" b="1" u="sng" dirty="0">
                         <a:solidFill>
@@ -6075,18 +6474,19 @@
             <p:ph sz="half" idx="2"/>
           </p:nvPr>
         </p:nvSpPr>
-        <p:spPr/>
+        <p:spPr>
+          <a:xfrm>
+            <a:off x="5656521" y="2228003"/>
+            <a:ext cx="5954288" cy="3633047"/>
+          </a:xfrm>
+        </p:spPr>
         <p:txBody>
           <a:bodyPr/>
           <a:lstStyle/>
           <a:p>
             <a:r>
               <a:rPr lang="en-US" dirty="0" smtClean="0"/>
-              <a:t>With 87.3% Overall Accuracy, </a:t>
-            </a:r>
-            <a:r>
-              <a:rPr lang="en-US" dirty="0"/>
-              <a:t>m</a:t>
+              <a:t>One of our custom logistic regression model yielded ten (</a:t>
             </a:r>
             <a:r>
               <a:rPr lang="en-US" dirty="0" smtClean="0">
@@ -6094,7 +6494,7 @@
                   <a:schemeClr val="tx1"/>
                 </a:solidFill>
               </a:rPr>
-              <a:t>anaging to these variables </a:t>
+              <a:t>10) </a:t>
             </a:r>
             <a:r>
               <a:rPr lang="en-US" dirty="0">
@@ -6102,17 +6502,96 @@
                   <a:schemeClr val="tx1"/>
                 </a:solidFill>
               </a:rPr>
-              <a:t>in developing and retaining employees could reduce and prevent attrition.</a:t>
-            </a:r>
-          </a:p>
-          <a:p>
-            <a:pPr marL="0" indent="0">
-              <a:buNone/>
-            </a:pPr>
+              <a:t>variables </a:t>
+            </a:r>
+            <a:r>
+              <a:rPr lang="en-US" dirty="0" smtClean="0">
+                <a:solidFill>
+                  <a:schemeClr val="tx1"/>
+                </a:solidFill>
+              </a:rPr>
+              <a:t>with an </a:t>
+            </a:r>
+            <a:r>
+              <a:rPr lang="en-US" dirty="0" smtClean="0"/>
+              <a:t>87% overall accuracy</a:t>
+            </a:r>
+          </a:p>
+          <a:p>
+            <a:r>
+              <a:rPr lang="en-US" dirty="0" smtClean="0"/>
+              <a:t>Environment, Job, and Relationship Satisfaction were identified as contributing factors in conjunction with the other seven (7) variables while not statistical significant in of itself with Job Role</a:t>
+            </a:r>
+          </a:p>
+          <a:p>
+            <a:r>
+              <a:rPr lang="en-US" dirty="0" smtClean="0"/>
+              <a:t>Only Job Involvement overlapped with our preliminary analysis</a:t>
+            </a:r>
+          </a:p>
+          <a:p>
             <a:endParaRPr lang="en-US" dirty="0" smtClean="0"/>
           </a:p>
           <a:p>
             <a:endParaRPr lang="en-US" dirty="0"/>
+          </a:p>
+        </p:txBody>
+      </p:sp>
+      <p:sp>
+        <p:nvSpPr>
+          <p:cNvPr id="3" name="TextBox 2"/>
+          <p:cNvSpPr txBox="1"/>
+          <p:nvPr/>
+        </p:nvSpPr>
+        <p:spPr>
+          <a:xfrm>
+            <a:off x="632770" y="5861050"/>
+            <a:ext cx="5103629" cy="276999"/>
+          </a:xfrm>
+          <a:prstGeom prst="rect">
+            <a:avLst/>
+          </a:prstGeom>
+          <a:noFill/>
+        </p:spPr>
+        <p:txBody>
+          <a:bodyPr wrap="square" rtlCol="0">
+            <a:spAutoFit/>
+          </a:bodyPr>
+          <a:lstStyle/>
+          <a:p>
+            <a:r>
+              <a:rPr lang="fr-FR" sz="1200" dirty="0" err="1" smtClean="0"/>
+              <a:t>Significance</a:t>
+            </a:r>
+            <a:r>
+              <a:rPr lang="fr-FR" sz="1200" dirty="0" smtClean="0"/>
+              <a:t> </a:t>
+            </a:r>
+            <a:r>
+              <a:rPr lang="fr-FR" sz="1200" dirty="0"/>
+              <a:t>codes: </a:t>
+            </a:r>
+            <a:r>
+              <a:rPr lang="fr-FR" sz="1200" dirty="0" smtClean="0"/>
+              <a:t>  0 </a:t>
+            </a:r>
+            <a:r>
+              <a:rPr lang="fr-FR" sz="1200" dirty="0"/>
+              <a:t>‘***’ </a:t>
+            </a:r>
+            <a:r>
+              <a:rPr lang="fr-FR" sz="1200" dirty="0" smtClean="0"/>
+              <a:t>     0.001 ‘**’     0.01 ‘*’     0.05 ‘.’      0.1 </a:t>
+            </a:r>
+            <a:r>
+              <a:rPr lang="fr-FR" sz="1200" dirty="0"/>
+              <a:t>‘ </a:t>
+            </a:r>
+            <a:r>
+              <a:rPr lang="fr-FR" sz="1200" dirty="0" smtClean="0"/>
+              <a:t>’</a:t>
+            </a:r>
+            <a:endParaRPr lang="en-US" sz="1200" dirty="0"/>
           </a:p>
         </p:txBody>
       </p:sp>
@@ -6126,6 +6605,13 @@
   <p:clrMapOvr>
     <a:masterClrMapping/>
   </p:clrMapOvr>
+  <p:timing>
+    <p:tnLst>
+      <p:par>
+        <p:cTn id="1" dur="indefinite" restart="never" nodeType="tmRoot"/>
+      </p:par>
+    </p:tnLst>
+  </p:timing>
 </p:sld>
 </file>
 
@@ -6148,7 +6634,7 @@
       </p:grpSpPr>
       <p:sp>
         <p:nvSpPr>
-          <p:cNvPr id="2" name="Title 1"/>
+          <p:cNvPr id="5" name="Title 4"/>
           <p:cNvSpPr>
             <a:spLocks noGrp="1"/>
           </p:cNvSpPr>
@@ -6162,6 +6648,829 @@
           <a:lstStyle/>
           <a:p>
             <a:r>
+              <a:rPr lang="en-US" dirty="0" smtClean="0"/>
+              <a:t>Conclusion</a:t>
+            </a:r>
+            <a:endParaRPr lang="en-US" dirty="0"/>
+          </a:p>
+        </p:txBody>
+      </p:sp>
+      <p:graphicFrame>
+        <p:nvGraphicFramePr>
+          <p:cNvPr id="12" name="Content Placeholder 11"/>
+          <p:cNvGraphicFramePr>
+            <a:graphicFrameLocks noGrp="1"/>
+          </p:cNvGraphicFramePr>
+          <p:nvPr>
+            <p:ph sz="half" idx="2"/>
+            <p:extLst>
+              <p:ext uri="{D42A27DB-BD31-4B8C-83A1-F6EECF244321}">
+                <p14:modId xmlns:p14="http://schemas.microsoft.com/office/powerpoint/2010/main" val="4029628570"/>
+              </p:ext>
+            </p:extLst>
+          </p:nvPr>
+        </p:nvGraphicFramePr>
+        <p:xfrm>
+          <a:off x="2227999" y="2053548"/>
+          <a:ext cx="8495913" cy="2123440"/>
+        </p:xfrm>
+        <a:graphic>
+          <a:graphicData uri="http://schemas.openxmlformats.org/drawingml/2006/table">
+            <a:tbl>
+              <a:tblPr firstRow="1" bandRow="1">
+                <a:tableStyleId>{5C22544A-7EE6-4342-B048-85BDC9FD1C3A}</a:tableStyleId>
+              </a:tblPr>
+              <a:tblGrid>
+                <a:gridCol w="2896968"/>
+                <a:gridCol w="1811004"/>
+                <a:gridCol w="2080147"/>
+                <a:gridCol w="1707794"/>
+              </a:tblGrid>
+              <a:tr h="370840">
+                <a:tc>
+                  <a:txBody>
+                    <a:bodyPr/>
+                    <a:lstStyle/>
+                    <a:p>
+                      <a:pPr algn="ctr"/>
+                      <a:r>
+                        <a:rPr lang="en-US" dirty="0" smtClean="0"/>
+                        <a:t>Model</a:t>
+                      </a:r>
+                      <a:endParaRPr lang="en-US" dirty="0"/>
+                    </a:p>
+                  </a:txBody>
+                  <a:tcPr anchor="ctr"/>
+                </a:tc>
+                <a:tc>
+                  <a:txBody>
+                    <a:bodyPr/>
+                    <a:lstStyle/>
+                    <a:p>
+                      <a:pPr algn="ctr"/>
+                      <a:r>
+                        <a:rPr lang="en-US" dirty="0" smtClean="0"/>
+                        <a:t>Logistic</a:t>
+                      </a:r>
+                      <a:r>
+                        <a:rPr lang="en-US" baseline="0" dirty="0" smtClean="0"/>
+                        <a:t> </a:t>
+                      </a:r>
+                      <a:r>
+                        <a:rPr lang="en-US" dirty="0" smtClean="0"/>
+                        <a:t>Regression #1</a:t>
+                      </a:r>
+                      <a:endParaRPr lang="en-US" dirty="0"/>
+                    </a:p>
+                  </a:txBody>
+                  <a:tcPr anchor="ctr"/>
+                </a:tc>
+                <a:tc>
+                  <a:txBody>
+                    <a:bodyPr/>
+                    <a:lstStyle/>
+                    <a:p>
+                      <a:pPr algn="ctr"/>
+                      <a:r>
+                        <a:rPr lang="en-US" dirty="0" smtClean="0"/>
+                        <a:t>Logistic</a:t>
+                      </a:r>
+                      <a:r>
+                        <a:rPr lang="en-US" baseline="0" dirty="0" smtClean="0"/>
+                        <a:t> </a:t>
+                      </a:r>
+                      <a:r>
+                        <a:rPr lang="en-US" dirty="0" smtClean="0"/>
+                        <a:t>Regression #2</a:t>
+                      </a:r>
+                      <a:endParaRPr lang="en-US" dirty="0"/>
+                    </a:p>
+                  </a:txBody>
+                  <a:tcPr anchor="ctr"/>
+                </a:tc>
+                <a:tc>
+                  <a:txBody>
+                    <a:bodyPr/>
+                    <a:lstStyle/>
+                    <a:p>
+                      <a:pPr algn="ctr"/>
+                      <a:r>
+                        <a:rPr lang="en-US" dirty="0" err="1" smtClean="0"/>
+                        <a:t>kNN</a:t>
+                      </a:r>
+                      <a:endParaRPr lang="en-US" dirty="0"/>
+                    </a:p>
+                  </a:txBody>
+                  <a:tcPr anchor="ctr"/>
+                </a:tc>
+              </a:tr>
+              <a:tr h="370840">
+                <a:tc>
+                  <a:txBody>
+                    <a:bodyPr/>
+                    <a:lstStyle/>
+                    <a:p>
+                      <a:pPr algn="ctr"/>
+                      <a:r>
+                        <a:rPr lang="en-US" dirty="0" smtClean="0"/>
+                        <a:t>Specificity (True Negative)</a:t>
+                      </a:r>
+                      <a:endParaRPr lang="en-US" dirty="0"/>
+                    </a:p>
+                  </a:txBody>
+                  <a:tcPr/>
+                </a:tc>
+                <a:tc>
+                  <a:txBody>
+                    <a:bodyPr/>
+                    <a:lstStyle/>
+                    <a:p>
+                      <a:pPr algn="ctr"/>
+                      <a:r>
+                        <a:rPr lang="en-US" dirty="0" smtClean="0"/>
+                        <a:t>78.95</a:t>
+                      </a:r>
+                      <a:endParaRPr lang="en-US" dirty="0"/>
+                    </a:p>
+                  </a:txBody>
+                  <a:tcPr anchor="ctr"/>
+                </a:tc>
+                <a:tc>
+                  <a:txBody>
+                    <a:bodyPr/>
+                    <a:lstStyle/>
+                    <a:p>
+                      <a:pPr algn="ctr"/>
+                      <a:r>
+                        <a:rPr lang="en-US" dirty="0" smtClean="0"/>
+                        <a:t>70.00</a:t>
+                      </a:r>
+                      <a:endParaRPr lang="en-US" dirty="0"/>
+                    </a:p>
+                  </a:txBody>
+                  <a:tcPr anchor="ctr"/>
+                </a:tc>
+                <a:tc>
+                  <a:txBody>
+                    <a:bodyPr/>
+                    <a:lstStyle/>
+                    <a:p>
+                      <a:pPr algn="ctr"/>
+                      <a:r>
+                        <a:rPr lang="en-US" dirty="0" smtClean="0"/>
+                        <a:t>54.54</a:t>
+                      </a:r>
+                      <a:endParaRPr lang="en-US" dirty="0"/>
+                    </a:p>
+                  </a:txBody>
+                  <a:tcPr anchor="ctr"/>
+                </a:tc>
+              </a:tr>
+              <a:tr h="370840">
+                <a:tc>
+                  <a:txBody>
+                    <a:bodyPr/>
+                    <a:lstStyle/>
+                    <a:p>
+                      <a:pPr algn="ctr"/>
+                      <a:r>
+                        <a:rPr lang="en-US" dirty="0" smtClean="0"/>
+                        <a:t>Sensitivity (True Positive)</a:t>
+                      </a:r>
+                      <a:endParaRPr lang="en-US" dirty="0"/>
+                    </a:p>
+                  </a:txBody>
+                  <a:tcPr/>
+                </a:tc>
+                <a:tc>
+                  <a:txBody>
+                    <a:bodyPr/>
+                    <a:lstStyle/>
+                    <a:p>
+                      <a:pPr algn="ctr"/>
+                      <a:r>
+                        <a:rPr lang="en-US" dirty="0" smtClean="0"/>
+                        <a:t>87.90</a:t>
+                      </a:r>
+                      <a:endParaRPr lang="en-US" dirty="0"/>
+                    </a:p>
+                  </a:txBody>
+                  <a:tcPr anchor="ctr"/>
+                </a:tc>
+                <a:tc>
+                  <a:txBody>
+                    <a:bodyPr/>
+                    <a:lstStyle/>
+                    <a:p>
+                      <a:pPr algn="ctr"/>
+                      <a:r>
+                        <a:rPr lang="en-US" dirty="0" smtClean="0"/>
+                        <a:t>85.52</a:t>
+                      </a:r>
+                      <a:endParaRPr lang="en-US" dirty="0"/>
+                    </a:p>
+                  </a:txBody>
+                  <a:tcPr anchor="ctr"/>
+                </a:tc>
+                <a:tc>
+                  <a:txBody>
+                    <a:bodyPr/>
+                    <a:lstStyle/>
+                    <a:p>
+                      <a:pPr algn="ctr"/>
+                      <a:r>
+                        <a:rPr lang="en-US" dirty="0" smtClean="0"/>
+                        <a:t>85.12</a:t>
+                      </a:r>
+                      <a:endParaRPr lang="en-US" dirty="0"/>
+                    </a:p>
+                  </a:txBody>
+                  <a:tcPr anchor="ctr"/>
+                </a:tc>
+              </a:tr>
+              <a:tr h="370840">
+                <a:tc>
+                  <a:txBody>
+                    <a:bodyPr/>
+                    <a:lstStyle/>
+                    <a:p>
+                      <a:pPr algn="ctr"/>
+                      <a:r>
+                        <a:rPr lang="en-US" dirty="0" smtClean="0"/>
+                        <a:t>Accuracy</a:t>
+                      </a:r>
+                      <a:endParaRPr lang="en-US" dirty="0"/>
+                    </a:p>
+                  </a:txBody>
+                  <a:tcPr/>
+                </a:tc>
+                <a:tc>
+                  <a:txBody>
+                    <a:bodyPr/>
+                    <a:lstStyle/>
+                    <a:p>
+                      <a:pPr algn="ctr"/>
+                      <a:r>
+                        <a:rPr lang="en-US" dirty="0" smtClean="0"/>
+                        <a:t>87%</a:t>
+                      </a:r>
+                      <a:endParaRPr lang="en-US" dirty="0"/>
+                    </a:p>
+                  </a:txBody>
+                  <a:tcPr anchor="ctr"/>
+                </a:tc>
+                <a:tc>
+                  <a:txBody>
+                    <a:bodyPr/>
+                    <a:lstStyle/>
+                    <a:p>
+                      <a:pPr algn="ctr"/>
+                      <a:r>
+                        <a:rPr lang="en-US" dirty="0" smtClean="0"/>
+                        <a:t>85%</a:t>
+                      </a:r>
+                      <a:endParaRPr lang="en-US" dirty="0"/>
+                    </a:p>
+                  </a:txBody>
+                  <a:tcPr anchor="ctr"/>
+                </a:tc>
+                <a:tc>
+                  <a:txBody>
+                    <a:bodyPr/>
+                    <a:lstStyle/>
+                    <a:p>
+                      <a:pPr algn="ctr"/>
+                      <a:r>
+                        <a:rPr lang="en-US" dirty="0" smtClean="0"/>
+                        <a:t>84%</a:t>
+                      </a:r>
+                      <a:endParaRPr lang="en-US" dirty="0"/>
+                    </a:p>
+                  </a:txBody>
+                  <a:tcPr anchor="ctr"/>
+                </a:tc>
+              </a:tr>
+              <a:tr h="370840">
+                <a:tc>
+                  <a:txBody>
+                    <a:bodyPr/>
+                    <a:lstStyle/>
+                    <a:p>
+                      <a:pPr algn="ctr"/>
+                      <a:r>
+                        <a:rPr lang="en-US" dirty="0" smtClean="0"/>
+                        <a:t>Number of Variables</a:t>
+                      </a:r>
+                      <a:endParaRPr lang="en-US" dirty="0"/>
+                    </a:p>
+                  </a:txBody>
+                  <a:tcPr/>
+                </a:tc>
+                <a:tc>
+                  <a:txBody>
+                    <a:bodyPr/>
+                    <a:lstStyle/>
+                    <a:p>
+                      <a:pPr algn="ctr"/>
+                      <a:r>
+                        <a:rPr lang="en-US" dirty="0" smtClean="0"/>
+                        <a:t>10</a:t>
+                      </a:r>
+                      <a:endParaRPr lang="en-US" dirty="0"/>
+                    </a:p>
+                  </a:txBody>
+                  <a:tcPr anchor="ctr"/>
+                </a:tc>
+                <a:tc>
+                  <a:txBody>
+                    <a:bodyPr/>
+                    <a:lstStyle/>
+                    <a:p>
+                      <a:pPr algn="ctr"/>
+                      <a:r>
+                        <a:rPr lang="en-US" dirty="0" smtClean="0"/>
+                        <a:t>5</a:t>
+                      </a:r>
+                      <a:endParaRPr lang="en-US" dirty="0"/>
+                    </a:p>
+                  </a:txBody>
+                  <a:tcPr anchor="ctr"/>
+                </a:tc>
+                <a:tc>
+                  <a:txBody>
+                    <a:bodyPr/>
+                    <a:lstStyle/>
+                    <a:p>
+                      <a:pPr algn="ctr"/>
+                      <a:r>
+                        <a:rPr lang="en-US" dirty="0" smtClean="0"/>
+                        <a:t>5</a:t>
+                      </a:r>
+                      <a:endParaRPr lang="en-US" dirty="0"/>
+                    </a:p>
+                  </a:txBody>
+                  <a:tcPr anchor="ctr"/>
+                </a:tc>
+              </a:tr>
+            </a:tbl>
+          </a:graphicData>
+        </a:graphic>
+      </p:graphicFrame>
+      <p:sp>
+        <p:nvSpPr>
+          <p:cNvPr id="3" name="Rectangle 2"/>
+          <p:cNvSpPr/>
+          <p:nvPr/>
+        </p:nvSpPr>
+        <p:spPr>
+          <a:xfrm>
+            <a:off x="2192055" y="3407079"/>
+            <a:ext cx="8754241" cy="425885"/>
+          </a:xfrm>
+          <a:prstGeom prst="rect">
+            <a:avLst/>
+          </a:prstGeom>
+          <a:noFill/>
+          <a:ln>
+            <a:solidFill>
+              <a:srgbClr val="FF0000"/>
+            </a:solidFill>
+          </a:ln>
+        </p:spPr>
+        <p:style>
+          <a:lnRef idx="2">
+            <a:schemeClr val="dk1"/>
+          </a:lnRef>
+          <a:fillRef idx="1">
+            <a:schemeClr val="lt1"/>
+          </a:fillRef>
+          <a:effectRef idx="0">
+            <a:schemeClr val="dk1"/>
+          </a:effectRef>
+          <a:fontRef idx="minor">
+            <a:schemeClr val="dk1"/>
+          </a:fontRef>
+        </p:style>
+        <p:txBody>
+          <a:bodyPr rtlCol="0" anchor="ctr"/>
+          <a:lstStyle/>
+          <a:p>
+            <a:pPr algn="ctr"/>
+            <a:endParaRPr lang="en-US"/>
+          </a:p>
+        </p:txBody>
+      </p:sp>
+      <p:sp>
+        <p:nvSpPr>
+          <p:cNvPr id="4" name="Rectangle 3"/>
+          <p:cNvSpPr/>
+          <p:nvPr/>
+        </p:nvSpPr>
+        <p:spPr>
+          <a:xfrm>
+            <a:off x="6913278" y="2007077"/>
+            <a:ext cx="2230722" cy="2286628"/>
+          </a:xfrm>
+          <a:prstGeom prst="rect">
+            <a:avLst/>
+          </a:prstGeom>
+          <a:noFill/>
+          <a:ln>
+            <a:solidFill>
+              <a:srgbClr val="00B050"/>
+            </a:solidFill>
+          </a:ln>
+        </p:spPr>
+        <p:style>
+          <a:lnRef idx="2">
+            <a:schemeClr val="accent1">
+              <a:shade val="50000"/>
+            </a:schemeClr>
+          </a:lnRef>
+          <a:fillRef idx="1">
+            <a:schemeClr val="accent1"/>
+          </a:fillRef>
+          <a:effectRef idx="0">
+            <a:schemeClr val="accent1"/>
+          </a:effectRef>
+          <a:fontRef idx="minor">
+            <a:schemeClr val="lt1"/>
+          </a:fontRef>
+        </p:style>
+        <p:txBody>
+          <a:bodyPr rtlCol="0" anchor="ctr"/>
+          <a:lstStyle/>
+          <a:p>
+            <a:pPr algn="ctr"/>
+            <a:endParaRPr lang="en-US"/>
+          </a:p>
+        </p:txBody>
+      </p:sp>
+      <p:graphicFrame>
+        <p:nvGraphicFramePr>
+          <p:cNvPr id="8" name="Content Placeholder 6"/>
+          <p:cNvGraphicFramePr>
+            <a:graphicFrameLocks noGrp="1"/>
+          </p:cNvGraphicFramePr>
+          <p:nvPr>
+            <p:ph sz="half" idx="1"/>
+            <p:extLst>
+              <p:ext uri="{D42A27DB-BD31-4B8C-83A1-F6EECF244321}">
+                <p14:modId xmlns:p14="http://schemas.microsoft.com/office/powerpoint/2010/main" val="238865191"/>
+              </p:ext>
+            </p:extLst>
+          </p:nvPr>
+        </p:nvGraphicFramePr>
+        <p:xfrm>
+          <a:off x="581193" y="4412073"/>
+          <a:ext cx="3978449" cy="2219960"/>
+        </p:xfrm>
+        <a:graphic>
+          <a:graphicData uri="http://schemas.openxmlformats.org/drawingml/2006/table">
+            <a:tbl>
+              <a:tblPr firstRow="1" bandRow="1">
+                <a:tableStyleId>{5C22544A-7EE6-4342-B048-85BDC9FD1C3A}</a:tableStyleId>
+              </a:tblPr>
+              <a:tblGrid>
+                <a:gridCol w="458635"/>
+                <a:gridCol w="3519814"/>
+              </a:tblGrid>
+              <a:tr h="346704">
+                <a:tc>
+                  <a:txBody>
+                    <a:bodyPr/>
+                    <a:lstStyle/>
+                    <a:p>
+                      <a:endParaRPr lang="en-US" dirty="0"/>
+                    </a:p>
+                  </a:txBody>
+                  <a:tcPr/>
+                </a:tc>
+                <a:tc>
+                  <a:txBody>
+                    <a:bodyPr/>
+                    <a:lstStyle/>
+                    <a:p>
+                      <a:endParaRPr lang="en-US"/>
+                    </a:p>
+                  </a:txBody>
+                  <a:tcPr/>
+                </a:tc>
+              </a:tr>
+              <a:tr h="370840">
+                <a:tc>
+                  <a:txBody>
+                    <a:bodyPr/>
+                    <a:lstStyle/>
+                    <a:p>
+                      <a:r>
+                        <a:rPr lang="en-US" dirty="0" smtClean="0"/>
+                        <a:t>1</a:t>
+                      </a:r>
+                      <a:endParaRPr lang="en-US" dirty="0"/>
+                    </a:p>
+                  </a:txBody>
+                  <a:tcPr/>
+                </a:tc>
+                <a:tc>
+                  <a:txBody>
+                    <a:bodyPr/>
+                    <a:lstStyle/>
+                    <a:p>
+                      <a:r>
+                        <a:rPr lang="en-US" dirty="0" smtClean="0"/>
+                        <a:t>Job Role</a:t>
+                      </a:r>
+                      <a:endParaRPr lang="en-US" dirty="0"/>
+                    </a:p>
+                  </a:txBody>
+                  <a:tcPr/>
+                </a:tc>
+              </a:tr>
+              <a:tr h="370840">
+                <a:tc>
+                  <a:txBody>
+                    <a:bodyPr/>
+                    <a:lstStyle/>
+                    <a:p>
+                      <a:r>
+                        <a:rPr lang="en-US" dirty="0" smtClean="0"/>
+                        <a:t>2</a:t>
+                      </a:r>
+                      <a:endParaRPr lang="en-US" dirty="0"/>
+                    </a:p>
+                  </a:txBody>
+                  <a:tcPr/>
+                </a:tc>
+                <a:tc>
+                  <a:txBody>
+                    <a:bodyPr/>
+                    <a:lstStyle/>
+                    <a:p>
+                      <a:r>
+                        <a:rPr lang="en-US" dirty="0" smtClean="0"/>
+                        <a:t>Number of Companies Worked</a:t>
+                      </a:r>
+                      <a:endParaRPr lang="en-US" dirty="0"/>
+                    </a:p>
+                  </a:txBody>
+                  <a:tcPr/>
+                </a:tc>
+              </a:tr>
+              <a:tr h="370840">
+                <a:tc>
+                  <a:txBody>
+                    <a:bodyPr/>
+                    <a:lstStyle/>
+                    <a:p>
+                      <a:r>
+                        <a:rPr lang="en-US" dirty="0" smtClean="0"/>
+                        <a:t>3</a:t>
+                      </a:r>
+                      <a:endParaRPr lang="en-US" dirty="0"/>
+                    </a:p>
+                  </a:txBody>
+                  <a:tcPr/>
+                </a:tc>
+                <a:tc>
+                  <a:txBody>
+                    <a:bodyPr/>
+                    <a:lstStyle/>
+                    <a:p>
+                      <a:r>
+                        <a:rPr lang="en-US" dirty="0" smtClean="0"/>
+                        <a:t>Overtime</a:t>
+                      </a:r>
+                      <a:endParaRPr lang="en-US" dirty="0"/>
+                    </a:p>
+                  </a:txBody>
+                  <a:tcPr/>
+                </a:tc>
+              </a:tr>
+              <a:tr h="370840">
+                <a:tc>
+                  <a:txBody>
+                    <a:bodyPr/>
+                    <a:lstStyle/>
+                    <a:p>
+                      <a:r>
+                        <a:rPr lang="en-US" dirty="0" smtClean="0"/>
+                        <a:t>4</a:t>
+                      </a:r>
+                      <a:endParaRPr lang="en-US" dirty="0"/>
+                    </a:p>
+                  </a:txBody>
+                  <a:tcPr/>
+                </a:tc>
+                <a:tc>
+                  <a:txBody>
+                    <a:bodyPr/>
+                    <a:lstStyle/>
+                    <a:p>
+                      <a:r>
+                        <a:rPr lang="en-US" dirty="0" smtClean="0"/>
+                        <a:t>Job Involvement</a:t>
+                      </a:r>
+                      <a:endParaRPr lang="en-US" dirty="0"/>
+                    </a:p>
+                  </a:txBody>
+                  <a:tcPr/>
+                </a:tc>
+              </a:tr>
+              <a:tr h="370840">
+                <a:tc>
+                  <a:txBody>
+                    <a:bodyPr/>
+                    <a:lstStyle/>
+                    <a:p>
+                      <a:r>
+                        <a:rPr lang="en-US" dirty="0" smtClean="0"/>
+                        <a:t>5</a:t>
+                      </a:r>
+                      <a:endParaRPr lang="en-US" dirty="0"/>
+                    </a:p>
+                  </a:txBody>
+                  <a:tcPr/>
+                </a:tc>
+                <a:tc>
+                  <a:txBody>
+                    <a:bodyPr/>
+                    <a:lstStyle/>
+                    <a:p>
+                      <a:r>
+                        <a:rPr lang="en-US" dirty="0" smtClean="0"/>
+                        <a:t>Marital</a:t>
+                      </a:r>
+                      <a:r>
+                        <a:rPr lang="en-US" baseline="0" dirty="0" smtClean="0"/>
+                        <a:t> Status</a:t>
+                      </a:r>
+                      <a:endParaRPr lang="en-US" dirty="0"/>
+                    </a:p>
+                  </a:txBody>
+                  <a:tcPr/>
+                </a:tc>
+              </a:tr>
+            </a:tbl>
+          </a:graphicData>
+        </a:graphic>
+      </p:graphicFrame>
+      <p:sp>
+        <p:nvSpPr>
+          <p:cNvPr id="6" name="Rectangle 5"/>
+          <p:cNvSpPr/>
+          <p:nvPr/>
+        </p:nvSpPr>
+        <p:spPr>
+          <a:xfrm>
+            <a:off x="4977008" y="4521012"/>
+            <a:ext cx="6633801" cy="1609671"/>
+          </a:xfrm>
+          <a:prstGeom prst="rect">
+            <a:avLst/>
+          </a:prstGeom>
+        </p:spPr>
+        <p:txBody>
+          <a:bodyPr wrap="square">
+            <a:spAutoFit/>
+          </a:bodyPr>
+          <a:lstStyle/>
+          <a:p>
+            <a:pPr marL="285750" indent="-285750">
+              <a:spcBef>
+                <a:spcPct val="20000"/>
+              </a:spcBef>
+              <a:spcAft>
+                <a:spcPts val="600"/>
+              </a:spcAft>
+              <a:buClr>
+                <a:schemeClr val="accent2"/>
+              </a:buClr>
+              <a:buSzPct val="92000"/>
+              <a:buFont typeface="Arial" panose="020B0604020202020204" pitchFamily="34" charset="0"/>
+              <a:buChar char="•"/>
+            </a:pPr>
+            <a:r>
+              <a:rPr lang="en-US" dirty="0" smtClean="0"/>
+              <a:t>We </a:t>
+            </a:r>
+            <a:r>
+              <a:rPr lang="en-US" dirty="0"/>
+              <a:t>caution against the illegal practice of Marital Status as </a:t>
+            </a:r>
+            <a:r>
+              <a:rPr lang="en-US" dirty="0" smtClean="0"/>
+              <a:t>a variable </a:t>
+            </a:r>
+            <a:r>
+              <a:rPr lang="en-US" dirty="0"/>
+              <a:t>in hiring </a:t>
+            </a:r>
+          </a:p>
+          <a:p>
+            <a:pPr marL="285750" indent="-285750">
+              <a:spcBef>
+                <a:spcPct val="20000"/>
+              </a:spcBef>
+              <a:spcAft>
+                <a:spcPts val="600"/>
+              </a:spcAft>
+              <a:buClr>
+                <a:schemeClr val="accent2"/>
+              </a:buClr>
+              <a:buSzPct val="92000"/>
+              <a:buFont typeface="Arial" panose="020B0604020202020204" pitchFamily="34" charset="0"/>
+              <a:buChar char="•"/>
+            </a:pPr>
+            <a:r>
+              <a:rPr lang="en-US" dirty="0"/>
+              <a:t>We recommend the </a:t>
+            </a:r>
+            <a:r>
+              <a:rPr lang="en-US" dirty="0" smtClean="0"/>
+              <a:t>management </a:t>
+            </a:r>
+            <a:r>
+              <a:rPr lang="en-US" dirty="0"/>
+              <a:t>of </a:t>
+            </a:r>
+            <a:r>
+              <a:rPr lang="en-US" dirty="0" smtClean="0"/>
+              <a:t>talent be </a:t>
+            </a:r>
+            <a:r>
+              <a:rPr lang="en-US" dirty="0"/>
+              <a:t>based on </a:t>
+            </a:r>
+            <a:r>
+              <a:rPr lang="en-US" dirty="0" smtClean="0"/>
+              <a:t>job role, </a:t>
+            </a:r>
+            <a:r>
+              <a:rPr lang="en-US" dirty="0"/>
+              <a:t>number of companies worked</a:t>
+            </a:r>
+            <a:r>
+              <a:rPr lang="en-US" dirty="0" smtClean="0"/>
+              <a:t>, overtime, and active polls of job involvement</a:t>
+            </a:r>
+            <a:endParaRPr lang="en-US" dirty="0"/>
+          </a:p>
+        </p:txBody>
+      </p:sp>
+    </p:spTree>
+    <p:extLst>
+      <p:ext uri="{BB962C8B-B14F-4D97-AF65-F5344CB8AC3E}">
+        <p14:creationId xmlns:p14="http://schemas.microsoft.com/office/powerpoint/2010/main" val="867640438"/>
+      </p:ext>
+    </p:extLst>
+  </p:cSld>
+  <p:clrMapOvr>
+    <a:masterClrMapping/>
+  </p:clrMapOvr>
+  <p:timing>
+    <p:tnLst>
+      <p:par>
+        <p:cTn id="1" dur="indefinite" restart="never" nodeType="tmRoot"/>
+      </p:par>
+    </p:tnLst>
+  </p:timing>
+</p:sld>
+</file>
+
+<file path=ppt/slides/slide12.xml><?xml version="1.0" encoding="utf-8"?>
+<p:sld xmlns:a="http://schemas.openxmlformats.org/drawingml/2006/main" xmlns:r="http://schemas.openxmlformats.org/officeDocument/2006/relationships" xmlns:p="http://schemas.openxmlformats.org/presentationml/2006/main">
+  <p:cSld>
+    <p:spTree>
+      <p:nvGrpSpPr>
+        <p:cNvPr id="1" name=""/>
+        <p:cNvGrpSpPr/>
+        <p:nvPr/>
+      </p:nvGrpSpPr>
+      <p:grpSpPr>
+        <a:xfrm>
+          <a:off x="0" y="0"/>
+          <a:ext cx="0" cy="0"/>
+          <a:chOff x="0" y="0"/>
+          <a:chExt cx="0" cy="0"/>
+        </a:xfrm>
+      </p:grpSpPr>
+      <p:sp>
+        <p:nvSpPr>
+          <p:cNvPr id="2" name="Title 1"/>
+          <p:cNvSpPr>
+            <a:spLocks noGrp="1"/>
+          </p:cNvSpPr>
+          <p:nvPr>
+            <p:ph type="title"/>
+          </p:nvPr>
+        </p:nvSpPr>
+        <p:spPr/>
+        <p:txBody>
+          <a:bodyPr/>
+          <a:lstStyle/>
+          <a:p>
+            <a:r>
               <a:rPr lang="en-US" dirty="0" err="1" smtClean="0"/>
               <a:t>CrEDITS</a:t>
             </a:r>
@@ -6186,14 +7495,23 @@
           <a:p>
             <a:r>
               <a:rPr lang="en-US" dirty="0" smtClean="0"/>
-              <a:t>ZACKARY GILL &amp; MAI LOAN TRAN</a:t>
-            </a:r>
-            <a:endParaRPr lang="en-US" dirty="0" smtClean="0"/>
+              <a:t>MAI LOAN TRAN</a:t>
+            </a:r>
           </a:p>
           <a:p>
             <a:r>
               <a:rPr lang="en-US" dirty="0" smtClean="0"/>
-              <a:t>YouTube:</a:t>
+              <a:t>ZACKARY GILL</a:t>
+            </a:r>
+          </a:p>
+          <a:p>
+            <a:r>
+              <a:rPr lang="en-US" smtClean="0"/>
+              <a:t>YouTube</a:t>
+            </a:r>
+            <a:r>
+              <a:rPr lang="en-US"/>
+              <a:t>: https://www.youtube.com/watch?v=gYZH6v3FLzw&amp;feature=youtu.be</a:t>
             </a:r>
             <a:endParaRPr lang="en-US" dirty="0" smtClean="0"/>
           </a:p>
@@ -6292,25 +7610,17 @@
           <a:p>
             <a:r>
               <a:rPr lang="en-US" sz="3600" dirty="0" smtClean="0"/>
-              <a:t>Identify job </a:t>
-            </a:r>
+              <a:t>Identify job role-specific trends</a:t>
+            </a:r>
+          </a:p>
+          <a:p>
             <a:r>
               <a:rPr lang="en-US" sz="3600" dirty="0"/>
-              <a:t>role's specific </a:t>
+              <a:t>Predict employee turnover for talent </a:t>
             </a:r>
             <a:r>
               <a:rPr lang="en-US" sz="3600" dirty="0" smtClean="0"/>
-              <a:t>trends</a:t>
-            </a:r>
-          </a:p>
-          <a:p>
-            <a:r>
-              <a:rPr lang="en-US" sz="3600" dirty="0"/>
-              <a:t>Predict employee turnover for talent management by conducting analysis of existing employee </a:t>
-            </a:r>
-            <a:r>
-              <a:rPr lang="en-US" sz="3600" dirty="0" smtClean="0"/>
-              <a:t>data</a:t>
+              <a:t>management</a:t>
             </a:r>
             <a:endParaRPr lang="en-US" sz="3600" dirty="0"/>
           </a:p>
@@ -6389,7 +7699,7 @@
         <p:spPr/>
         <p:txBody>
           <a:bodyPr>
-            <a:normAutofit lnSpcReduction="10000"/>
+            <a:normAutofit/>
           </a:bodyPr>
           <a:lstStyle/>
           <a:p>
@@ -6399,11 +7709,7 @@
             </a:pPr>
             <a:r>
               <a:rPr lang="en-US" sz="2000" dirty="0" smtClean="0"/>
-              <a:t>Performed exploratory data analysis </a:t>
-            </a:r>
-            <a:r>
-              <a:rPr lang="en-US" sz="2000" dirty="0" smtClean="0"/>
-              <a:t>of 1170 employees with 37 variables</a:t>
+              <a:t>Performed exploratory data analysis of 1170 employees with 37 variables</a:t>
             </a:r>
           </a:p>
           <a:p>
@@ -6423,7 +7729,7 @@
             </a:pPr>
             <a:r>
               <a:rPr lang="en-US" sz="2000" dirty="0" smtClean="0"/>
-              <a:t>Performed testing for statistical significance of attrition against the differing pairs of variables</a:t>
+              <a:t>Performed testing for statistical significance of attrition with each of the other variables</a:t>
             </a:r>
           </a:p>
           <a:p>
@@ -6433,11 +7739,7 @@
             </a:pPr>
             <a:r>
               <a:rPr lang="en-US" sz="2000" dirty="0" smtClean="0"/>
-              <a:t>Analyzed job role trends from the surve</a:t>
-            </a:r>
-            <a:r>
-              <a:rPr lang="en-US" sz="2000" dirty="0" smtClean="0"/>
-              <a:t>y of job satisfaction, environment satisfaction, relationship satisfaction, and work life balance</a:t>
+              <a:t>Analyzed job role trends from the survey of job, environment, relationship satisfaction, and work life balance</a:t>
             </a:r>
           </a:p>
           <a:p>
@@ -6453,7 +7755,7 @@
             </a:pPr>
             <a:r>
               <a:rPr lang="en-US" sz="2000" dirty="0" smtClean="0"/>
-              <a:t>Utilized four different statistical models to determine the best prediction model with the highest overall accuracy rate</a:t>
+              <a:t>Tested different statistical models to determine the best prediction model with the highest overall accuracy rate</a:t>
             </a:r>
           </a:p>
           <a:p>
@@ -6503,70 +7805,195 @@
       </p:grpSpPr>
       <p:sp>
         <p:nvSpPr>
-          <p:cNvPr id="2" name="Title 1"/>
+          <p:cNvPr id="4" name="Title 3"/>
           <p:cNvSpPr>
             <a:spLocks noGrp="1"/>
           </p:cNvSpPr>
           <p:nvPr>
             <p:ph type="title"/>
+          </p:nvPr>
+        </p:nvSpPr>
+        <p:spPr/>
+        <p:txBody>
+          <a:bodyPr/>
+          <a:lstStyle/>
+          <a:p>
+            <a:r>
+              <a:rPr lang="en-US" dirty="0" smtClean="0"/>
+              <a:t>Example of correlation assessment</a:t>
+            </a:r>
+            <a:endParaRPr lang="en-US" dirty="0"/>
+          </a:p>
+        </p:txBody>
+      </p:sp>
+      <p:sp>
+        <p:nvSpPr>
+          <p:cNvPr id="5" name="Content Placeholder 4"/>
+          <p:cNvSpPr>
+            <a:spLocks noGrp="1"/>
+          </p:cNvSpPr>
+          <p:nvPr>
+            <p:ph sz="half" idx="1"/>
           </p:nvPr>
         </p:nvSpPr>
         <p:spPr>
           <a:xfrm>
-            <a:off x="581192" y="702156"/>
-            <a:ext cx="11029616" cy="552486"/>
+            <a:off x="581193" y="1977656"/>
+            <a:ext cx="5422390" cy="4784651"/>
           </a:xfrm>
         </p:spPr>
         <p:txBody>
-          <a:bodyPr/>
+          <a:bodyPr>
+            <a:normAutofit fontScale="62500" lnSpcReduction="20000"/>
+          </a:bodyPr>
           <a:lstStyle/>
           <a:p>
             <a:r>
               <a:rPr lang="en-US" dirty="0" smtClean="0"/>
-              <a:t>Plots of all variables</a:t>
-            </a:r>
+              <a:t>Attrition vs…</a:t>
+            </a:r>
+          </a:p>
+          <a:p>
+            <a:pPr lvl="1"/>
+            <a:r>
+              <a:rPr lang="en-US" dirty="0" smtClean="0"/>
+              <a:t>Training Times Last Year</a:t>
+            </a:r>
+          </a:p>
+          <a:p>
+            <a:pPr lvl="1"/>
+            <a:r>
+              <a:rPr lang="en-US" dirty="0" smtClean="0"/>
+              <a:t>Work Life Balance</a:t>
+            </a:r>
+          </a:p>
+          <a:p>
+            <a:pPr lvl="1"/>
+            <a:r>
+              <a:rPr lang="en-US" dirty="0" smtClean="0"/>
+              <a:t>Years at Company</a:t>
+            </a:r>
+          </a:p>
+          <a:p>
+            <a:pPr lvl="1"/>
+            <a:r>
+              <a:rPr lang="en-US" dirty="0" smtClean="0"/>
+              <a:t>Years in Current Role</a:t>
+            </a:r>
+          </a:p>
+          <a:p>
+            <a:pPr lvl="1"/>
+            <a:r>
+              <a:rPr lang="en-US" dirty="0" smtClean="0"/>
+              <a:t>Etc.</a:t>
+            </a:r>
+          </a:p>
+          <a:p>
+            <a:r>
+              <a:rPr lang="en-US" dirty="0" smtClean="0"/>
+              <a:t>Training Times Last Year vs…</a:t>
+            </a:r>
+          </a:p>
+          <a:p>
+            <a:pPr lvl="1"/>
+            <a:r>
+              <a:rPr lang="en-US" dirty="0" smtClean="0"/>
+              <a:t>Work Life Balance</a:t>
+            </a:r>
+          </a:p>
+          <a:p>
+            <a:pPr lvl="1"/>
+            <a:r>
+              <a:rPr lang="en-US" dirty="0" smtClean="0"/>
+              <a:t>Years at Company</a:t>
+            </a:r>
+          </a:p>
+          <a:p>
+            <a:pPr lvl="1"/>
+            <a:r>
+              <a:rPr lang="en-US" dirty="0" smtClean="0"/>
+              <a:t>Years in Current Role</a:t>
+            </a:r>
+          </a:p>
+          <a:p>
+            <a:pPr lvl="1"/>
+            <a:r>
+              <a:rPr lang="en-US" dirty="0" smtClean="0"/>
+              <a:t>Etc.</a:t>
+            </a:r>
+          </a:p>
+          <a:p>
+            <a:r>
+              <a:rPr lang="en-US" dirty="0" smtClean="0"/>
+              <a:t>Work Life Balance vs…</a:t>
+            </a:r>
+          </a:p>
+          <a:p>
+            <a:pPr lvl="1"/>
+            <a:r>
+              <a:rPr lang="en-US" dirty="0" smtClean="0"/>
+              <a:t>Years at Company</a:t>
+            </a:r>
+          </a:p>
+          <a:p>
+            <a:pPr lvl="1"/>
+            <a:r>
+              <a:rPr lang="en-US" dirty="0" smtClean="0"/>
+              <a:t>Years in Current Role</a:t>
+            </a:r>
+          </a:p>
+          <a:p>
+            <a:pPr lvl="1"/>
+            <a:r>
+              <a:rPr lang="en-US" dirty="0" err="1" smtClean="0"/>
+              <a:t>Etc</a:t>
+            </a:r>
+            <a:endParaRPr lang="en-US" dirty="0" smtClean="0"/>
+          </a:p>
+          <a:p>
+            <a:r>
+              <a:rPr lang="en-US" dirty="0" smtClean="0"/>
+              <a:t>Years at Company vs…</a:t>
+            </a:r>
+          </a:p>
+          <a:p>
+            <a:pPr lvl="1"/>
+            <a:r>
+              <a:rPr lang="en-US" dirty="0" smtClean="0"/>
+              <a:t>Years in Current Role</a:t>
+            </a:r>
+          </a:p>
+          <a:p>
+            <a:pPr lvl="1"/>
+            <a:r>
+              <a:rPr lang="en-US" dirty="0" smtClean="0"/>
+              <a:t>Etc.</a:t>
+            </a:r>
+          </a:p>
+          <a:p>
+            <a:r>
+              <a:rPr lang="en-US" dirty="0" err="1" smtClean="0"/>
+              <a:t>Etc</a:t>
+            </a:r>
+            <a:r>
+              <a:rPr lang="en-US" dirty="0" smtClean="0"/>
+              <a:t>…for all 37 variables in pairs</a:t>
+            </a:r>
+          </a:p>
+          <a:p>
             <a:endParaRPr lang="en-US" dirty="0"/>
           </a:p>
         </p:txBody>
       </p:sp>
       <p:pic>
         <p:nvPicPr>
-          <p:cNvPr id="4" name="Content Placeholder 3"/>
+          <p:cNvPr id="7" name="Content Placeholder 6"/>
           <p:cNvPicPr>
             <a:picLocks noGrp="1" noChangeAspect="1"/>
           </p:cNvPicPr>
           <p:nvPr>
-            <p:ph idx="1"/>
-          </p:nvPr>
-        </p:nvPicPr>
-        <p:blipFill>
-          <a:blip r:embed="rId2"/>
-          <a:stretch>
-            <a:fillRect/>
-          </a:stretch>
-        </p:blipFill>
-        <p:spPr>
-          <a:xfrm>
-            <a:off x="581192" y="1254642"/>
-            <a:ext cx="4565387" cy="2663736"/>
-          </a:xfrm>
-          <a:prstGeom prst="rect">
-            <a:avLst/>
-          </a:prstGeom>
-          <a:ln>
-            <a:solidFill>
-              <a:schemeClr val="accent1"/>
-            </a:solidFill>
-          </a:ln>
-        </p:spPr>
-      </p:pic>
-      <p:pic>
-        <p:nvPicPr>
-          <p:cNvPr id="5" name="Picture 4"/>
-          <p:cNvPicPr>
-            <a:picLocks noChangeAspect="1"/>
-          </p:cNvPicPr>
-          <p:nvPr/>
+            <p:ph sz="half" idx="2"/>
+          </p:nvPr>
         </p:nvPicPr>
         <p:blipFill>
           <a:blip r:embed="rId3"/>
@@ -6576,116 +8003,31 @@
         </p:blipFill>
         <p:spPr>
           <a:xfrm>
-            <a:off x="581192" y="4040919"/>
-            <a:ext cx="4565387" cy="2650186"/>
+            <a:off x="6149035" y="1876389"/>
+            <a:ext cx="4993885" cy="4620588"/>
           </a:xfrm>
           <a:prstGeom prst="rect">
             <a:avLst/>
           </a:prstGeom>
-          <a:ln>
-            <a:solidFill>
-              <a:schemeClr val="accent1"/>
-            </a:solidFill>
-          </a:ln>
-        </p:spPr>
-      </p:pic>
-      <p:pic>
-        <p:nvPicPr>
-          <p:cNvPr id="6" name="Picture 5"/>
-          <p:cNvPicPr>
-            <a:picLocks noChangeAspect="1"/>
-          </p:cNvPicPr>
-          <p:nvPr/>
-        </p:nvPicPr>
-        <p:blipFill>
-          <a:blip r:embed="rId4"/>
-          <a:stretch>
-            <a:fillRect/>
-          </a:stretch>
-        </p:blipFill>
-        <p:spPr>
-          <a:xfrm>
-            <a:off x="7087948" y="3950809"/>
-            <a:ext cx="4522860" cy="2617755"/>
-          </a:xfrm>
-          <a:prstGeom prst="rect">
-            <a:avLst/>
-          </a:prstGeom>
-          <a:ln>
-            <a:solidFill>
-              <a:schemeClr val="accent1"/>
-            </a:solidFill>
-          </a:ln>
-        </p:spPr>
-      </p:pic>
-      <p:pic>
-        <p:nvPicPr>
-          <p:cNvPr id="7" name="Picture 6"/>
-          <p:cNvPicPr>
-            <a:picLocks noChangeAspect="1"/>
-          </p:cNvPicPr>
-          <p:nvPr/>
-        </p:nvPicPr>
-        <p:blipFill>
-          <a:blip r:embed="rId5"/>
-          <a:stretch>
-            <a:fillRect/>
-          </a:stretch>
-        </p:blipFill>
-        <p:spPr>
-          <a:xfrm>
-            <a:off x="6992255" y="1128434"/>
-            <a:ext cx="4618553" cy="2676171"/>
-          </a:xfrm>
-          <a:prstGeom prst="rect">
-            <a:avLst/>
-          </a:prstGeom>
-          <a:ln>
-            <a:solidFill>
-              <a:schemeClr val="accent1"/>
-            </a:solidFill>
-          </a:ln>
-        </p:spPr>
-      </p:pic>
-      <p:pic>
-        <p:nvPicPr>
-          <p:cNvPr id="8" name="Picture 7"/>
-          <p:cNvPicPr>
-            <a:picLocks noChangeAspect="1"/>
-          </p:cNvPicPr>
-          <p:nvPr/>
-        </p:nvPicPr>
-        <p:blipFill>
-          <a:blip r:embed="rId6"/>
-          <a:stretch>
-            <a:fillRect/>
-          </a:stretch>
-        </p:blipFill>
-        <p:spPr>
-          <a:xfrm>
-            <a:off x="3630805" y="2364300"/>
-            <a:ext cx="4877223" cy="2880610"/>
-          </a:xfrm>
-          <a:prstGeom prst="rect">
-            <a:avLst/>
-          </a:prstGeom>
-          <a:ln>
-            <a:solidFill>
-              <a:schemeClr val="accent1"/>
-            </a:solidFill>
-          </a:ln>
         </p:spPr>
       </p:pic>
     </p:spTree>
     <p:extLst>
       <p:ext uri="{BB962C8B-B14F-4D97-AF65-F5344CB8AC3E}">
-        <p14:creationId xmlns:p14="http://schemas.microsoft.com/office/powerpoint/2010/main" val="2069054839"/>
+        <p14:creationId xmlns:p14="http://schemas.microsoft.com/office/powerpoint/2010/main" val="4173901439"/>
       </p:ext>
     </p:extLst>
   </p:cSld>
   <p:clrMapOvr>
     <a:masterClrMapping/>
   </p:clrMapOvr>
+  <p:timing>
+    <p:tnLst>
+      <p:par>
+        <p:cTn id="1" dur="indefinite" restart="never" nodeType="tmRoot"/>
+      </p:par>
+    </p:tnLst>
+  </p:timing>
 </p:sld>
 </file>
 
@@ -6739,14 +8081,14 @@
             <p:ph sz="half" idx="1"/>
             <p:extLst>
               <p:ext uri="{D42A27DB-BD31-4B8C-83A1-F6EECF244321}">
-                <p14:modId xmlns:p14="http://schemas.microsoft.com/office/powerpoint/2010/main" val="3273189739"/>
+                <p14:modId xmlns:p14="http://schemas.microsoft.com/office/powerpoint/2010/main" val="2955800914"/>
               </p:ext>
             </p:extLst>
           </p:nvPr>
         </p:nvGraphicFramePr>
         <p:xfrm>
           <a:off x="464067" y="2003979"/>
-          <a:ext cx="5421940" cy="4437780"/>
+          <a:ext cx="4682091" cy="4437780"/>
         </p:xfrm>
         <a:graphic>
           <a:graphicData uri="http://schemas.openxmlformats.org/drawingml/2006/table">
@@ -6757,7 +8099,7 @@
               <a:tblGrid>
                 <a:gridCol w="520693"/>
                 <a:gridCol w="3005238"/>
-                <a:gridCol w="1896009"/>
+                <a:gridCol w="1156160"/>
               </a:tblGrid>
               <a:tr h="295852">
                 <a:tc>
@@ -6788,7 +8130,7 @@
                       <a:pPr algn="ctr"/>
                       <a:r>
                         <a:rPr lang="en-US" sz="1200" dirty="0" smtClean="0"/>
-                        <a:t>p-value</a:t>
+                        <a:t>Significance</a:t>
                       </a:r>
                       <a:endParaRPr lang="en-US" sz="1200" dirty="0"/>
                     </a:p>
@@ -6833,7 +8175,7 @@
                       <a:pPr algn="l"/>
                       <a:r>
                         <a:rPr lang="en-US" sz="1200" dirty="0" smtClean="0"/>
-                        <a:t>0.000000008709424</a:t>
+                        <a:t>***</a:t>
                       </a:r>
                       <a:endParaRPr lang="en-US" sz="1200" dirty="0"/>
                     </a:p>
@@ -6875,34 +8217,12 @@
                     <a:bodyPr/>
                     <a:lstStyle/>
                     <a:p>
-                      <a:pPr marL="0" marR="0" lvl="0" indent="0" algn="l" defTabSz="457200" rtl="0" eaLnBrk="1" fontAlgn="auto" latinLnBrk="0" hangingPunct="1">
-                        <a:lnSpc>
-                          <a:spcPct val="100000"/>
-                        </a:lnSpc>
-                        <a:spcBef>
-                          <a:spcPts val="0"/>
-                        </a:spcBef>
-                        <a:spcAft>
-                          <a:spcPts val="0"/>
-                        </a:spcAft>
-                        <a:buClrTx/>
-                        <a:buSzTx/>
-                        <a:buFontTx/>
-                        <a:buNone/>
-                        <a:tabLst/>
-                        <a:defRPr/>
-                      </a:pPr>
-                      <a:r>
-                        <a:rPr lang="en-US" sz="1200" kern="1200" dirty="0" smtClean="0">
-                          <a:solidFill>
-                            <a:schemeClr val="dk1"/>
-                          </a:solidFill>
-                          <a:latin typeface="+mn-lt"/>
-                          <a:ea typeface="+mn-ea"/>
-                          <a:cs typeface="+mn-cs"/>
-                        </a:rPr>
-                        <a:t>0.00000001128308</a:t>
-                      </a:r>
+                      <a:pPr algn="l"/>
+                      <a:r>
+                        <a:rPr lang="en-US" sz="1200" dirty="0" smtClean="0"/>
+                        <a:t>***</a:t>
+                      </a:r>
+                      <a:endParaRPr lang="en-US" sz="1200" dirty="0"/>
                     </a:p>
                   </a:txBody>
                   <a:tcPr marL="110923" marR="110923"/>
@@ -6945,7 +8265,7 @@
                       <a:pPr algn="l"/>
                       <a:r>
                         <a:rPr lang="en-US" sz="1200" dirty="0" smtClean="0"/>
-                        <a:t>0.00000004575077</a:t>
+                        <a:t>***</a:t>
                       </a:r>
                       <a:endParaRPr lang="en-US" sz="1200" dirty="0"/>
                     </a:p>
@@ -6990,7 +8310,7 @@
                       <a:pPr algn="l"/>
                       <a:r>
                         <a:rPr lang="en-US" sz="1200" dirty="0" smtClean="0"/>
-                        <a:t>0.0000000678404</a:t>
+                        <a:t>***</a:t>
                       </a:r>
                       <a:endParaRPr lang="en-US" sz="1200" dirty="0"/>
                     </a:p>
@@ -7035,7 +8355,7 @@
                       <a:pPr algn="l"/>
                       <a:r>
                         <a:rPr lang="en-US" sz="1200" dirty="0" smtClean="0"/>
-                        <a:t>0.0000004870058</a:t>
+                        <a:t>***</a:t>
                       </a:r>
                       <a:endParaRPr lang="en-US" sz="1200" dirty="0"/>
                     </a:p>
@@ -7080,7 +8400,7 @@
                       <a:pPr algn="l"/>
                       <a:r>
                         <a:rPr lang="en-US" sz="1200" dirty="0" smtClean="0"/>
-                        <a:t>0.000002810696</a:t>
+                        <a:t>***</a:t>
                       </a:r>
                       <a:endParaRPr lang="en-US" sz="1200" dirty="0"/>
                     </a:p>
@@ -7129,7 +8449,7 @@
                       <a:pPr algn="l"/>
                       <a:r>
                         <a:rPr lang="en-US" sz="1200" dirty="0" smtClean="0"/>
-                        <a:t>0.000004046543</a:t>
+                        <a:t>***</a:t>
                       </a:r>
                       <a:endParaRPr lang="en-US" sz="1200" dirty="0"/>
                     </a:p>
@@ -7178,7 +8498,7 @@
                       <a:pPr algn="l"/>
                       <a:r>
                         <a:rPr lang="en-US" sz="1200" dirty="0" smtClean="0"/>
-                        <a:t>0.00004180637</a:t>
+                        <a:t>***</a:t>
                       </a:r>
                       <a:endParaRPr lang="en-US" sz="1200" dirty="0"/>
                     </a:p>
@@ -7223,7 +8543,7 @@
                       <a:pPr algn="l"/>
                       <a:r>
                         <a:rPr lang="en-US" sz="1200" dirty="0" smtClean="0"/>
-                        <a:t>0.00004809215</a:t>
+                        <a:t>***</a:t>
                       </a:r>
                       <a:endParaRPr lang="en-US" sz="1200" dirty="0"/>
                     </a:p>
@@ -7268,7 +8588,7 @@
                       <a:pPr algn="l"/>
                       <a:r>
                         <a:rPr lang="en-US" sz="1200" dirty="0" smtClean="0"/>
-                        <a:t>0.002175252</a:t>
+                        <a:t>**</a:t>
                       </a:r>
                       <a:endParaRPr lang="en-US" sz="1200" dirty="0"/>
                     </a:p>
@@ -7313,7 +8633,7 @@
                       <a:pPr algn="l"/>
                       <a:r>
                         <a:rPr lang="en-US" sz="1200" dirty="0" smtClean="0"/>
-                        <a:t>0.008</a:t>
+                        <a:t>**</a:t>
                       </a:r>
                       <a:endParaRPr lang="en-US" sz="1200" dirty="0"/>
                     </a:p>
@@ -7362,7 +8682,7 @@
                       <a:pPr algn="l"/>
                       <a:r>
                         <a:rPr lang="en-US" sz="1200" dirty="0" smtClean="0"/>
-                        <a:t>0.02282312</a:t>
+                        <a:t>*</a:t>
                       </a:r>
                       <a:endParaRPr lang="en-US" sz="1200" dirty="0"/>
                     </a:p>
@@ -7407,7 +8727,7 @@
                       <a:pPr algn="l"/>
                       <a:r>
                         <a:rPr lang="en-US" sz="1200" dirty="0" smtClean="0"/>
-                        <a:t>0.0229</a:t>
+                        <a:t>*</a:t>
                       </a:r>
                       <a:endParaRPr lang="en-US" sz="1200" dirty="0"/>
                     </a:p>
@@ -7456,7 +8776,7 @@
                       <a:pPr algn="l"/>
                       <a:r>
                         <a:rPr lang="en-US" sz="1200" dirty="0" smtClean="0"/>
-                        <a:t>0.031</a:t>
+                        <a:t>*</a:t>
                       </a:r>
                       <a:endParaRPr lang="en-US" sz="1200" dirty="0"/>
                     </a:p>
@@ -7489,12 +8809,75 @@
             </a:r>
             <a:r>
               <a:rPr lang="en-US" dirty="0" smtClean="0"/>
-              <a:t>are 14 </a:t>
+              <a:t>were 14 </a:t>
             </a:r>
             <a:r>
               <a:rPr lang="en-US" dirty="0"/>
               <a:t>statistically significant variables </a:t>
             </a:r>
+            <a:r>
+              <a:rPr lang="en-US" dirty="0" smtClean="0"/>
+              <a:t>that could contribute to attrition</a:t>
+            </a:r>
+            <a:endParaRPr lang="en-US" dirty="0"/>
+          </a:p>
+        </p:txBody>
+      </p:sp>
+      <p:sp>
+        <p:nvSpPr>
+          <p:cNvPr id="6" name="TextBox 5"/>
+          <p:cNvSpPr txBox="1"/>
+          <p:nvPr/>
+        </p:nvSpPr>
+        <p:spPr>
+          <a:xfrm>
+            <a:off x="6188417" y="6094064"/>
+            <a:ext cx="5103629" cy="276999"/>
+          </a:xfrm>
+          <a:prstGeom prst="rect">
+            <a:avLst/>
+          </a:prstGeom>
+          <a:noFill/>
+        </p:spPr>
+        <p:txBody>
+          <a:bodyPr wrap="square" rtlCol="0">
+            <a:spAutoFit/>
+          </a:bodyPr>
+          <a:lstStyle/>
+          <a:p>
+            <a:r>
+              <a:rPr lang="fr-FR" sz="1200" dirty="0" err="1" smtClean="0"/>
+              <a:t>Significance</a:t>
+            </a:r>
+            <a:r>
+              <a:rPr lang="fr-FR" sz="1200" dirty="0" smtClean="0"/>
+              <a:t> </a:t>
+            </a:r>
+            <a:r>
+              <a:rPr lang="fr-FR" sz="1200" dirty="0"/>
+              <a:t>codes: </a:t>
+            </a:r>
+            <a:r>
+              <a:rPr lang="fr-FR" sz="1200" dirty="0" smtClean="0"/>
+              <a:t>  0 </a:t>
+            </a:r>
+            <a:r>
+              <a:rPr lang="fr-FR" sz="1200" dirty="0"/>
+              <a:t>‘***’ </a:t>
+            </a:r>
+            <a:r>
+              <a:rPr lang="fr-FR" sz="1200" dirty="0" smtClean="0"/>
+              <a:t>     0.001 ‘**’     0.01 ‘*’     0.05 ‘.’      0.1 </a:t>
+            </a:r>
+            <a:r>
+              <a:rPr lang="fr-FR" sz="1200" dirty="0"/>
+              <a:t>‘ </a:t>
+            </a:r>
+            <a:r>
+              <a:rPr lang="fr-FR" sz="1200" dirty="0" smtClean="0"/>
+              <a:t>’</a:t>
+            </a:r>
+            <a:endParaRPr lang="en-US" sz="1200" dirty="0"/>
           </a:p>
         </p:txBody>
       </p:sp>
@@ -7508,6 +8891,13 @@
   <p:clrMapOvr>
     <a:masterClrMapping/>
   </p:clrMapOvr>
+  <p:timing>
+    <p:tnLst>
+      <p:par>
+        <p:cTn id="1" dur="indefinite" restart="never" nodeType="tmRoot"/>
+      </p:par>
+    </p:tnLst>
+  </p:timing>
 </p:sld>
 </file>
 
@@ -7551,15 +8941,41 @@
           </a:p>
         </p:txBody>
       </p:sp>
+      <p:sp>
+        <p:nvSpPr>
+          <p:cNvPr id="8" name="Content Placeholder 7"/>
+          <p:cNvSpPr>
+            <a:spLocks noGrp="1"/>
+          </p:cNvSpPr>
+          <p:nvPr>
+            <p:ph sz="half" idx="2"/>
+          </p:nvPr>
+        </p:nvSpPr>
+        <p:spPr>
+          <a:xfrm>
+            <a:off x="7347044" y="2069628"/>
+            <a:ext cx="3902203" cy="781011"/>
+          </a:xfrm>
+        </p:spPr>
+        <p:txBody>
+          <a:bodyPr/>
+          <a:lstStyle/>
+          <a:p>
+            <a:r>
+              <a:rPr lang="en-US" dirty="0" smtClean="0"/>
+              <a:t>Job Satisfaction Mean by Role</a:t>
+            </a:r>
+            <a:endParaRPr lang="en-US" dirty="0"/>
+          </a:p>
+        </p:txBody>
+      </p:sp>
       <p:pic>
         <p:nvPicPr>
-          <p:cNvPr id="6" name="Content Placeholder 5"/>
+          <p:cNvPr id="13" name="Picture 12"/>
           <p:cNvPicPr>
-            <a:picLocks noGrp="1" noChangeAspect="1"/>
+            <a:picLocks noChangeAspect="1"/>
           </p:cNvPicPr>
-          <p:nvPr>
-            <p:ph sz="half" idx="1"/>
-          </p:nvPr>
+          <p:nvPr/>
         </p:nvPicPr>
         <p:blipFill>
           <a:blip r:embed="rId3"/>
@@ -7569,8 +8985,8 @@
         </p:blipFill>
         <p:spPr>
           <a:xfrm>
-            <a:off x="294393" y="2115879"/>
-            <a:ext cx="6765626" cy="4394215"/>
+            <a:off x="7544243" y="2768247"/>
+            <a:ext cx="3705004" cy="1825017"/>
           </a:xfrm>
           <a:prstGeom prst="rect">
             <a:avLst/>
@@ -7579,35 +8995,53 @@
       </p:pic>
       <p:sp>
         <p:nvSpPr>
-          <p:cNvPr id="8" name="Content Placeholder 7"/>
-          <p:cNvSpPr>
-            <a:spLocks noGrp="1"/>
-          </p:cNvSpPr>
-          <p:nvPr>
-            <p:ph sz="half" idx="2"/>
-          </p:nvPr>
+          <p:cNvPr id="9" name="TextBox 8"/>
+          <p:cNvSpPr txBox="1"/>
+          <p:nvPr/>
         </p:nvSpPr>
         <p:spPr>
           <a:xfrm>
-            <a:off x="7347044" y="2069628"/>
-            <a:ext cx="3902203" cy="781011"/>
+            <a:off x="2084251" y="6198896"/>
+            <a:ext cx="3710494" cy="276999"/>
           </a:xfrm>
+          <a:prstGeom prst="rect">
+            <a:avLst/>
+          </a:prstGeom>
+          <a:noFill/>
         </p:spPr>
         <p:txBody>
-          <a:bodyPr/>
+          <a:bodyPr wrap="square" rtlCol="0">
+            <a:spAutoFit/>
+          </a:bodyPr>
           <a:lstStyle/>
           <a:p>
             <a:r>
-              <a:rPr lang="en-US" dirty="0" smtClean="0"/>
-              <a:t>Job Satisfaction Mean by Role</a:t>
-            </a:r>
-            <a:endParaRPr lang="en-US" dirty="0"/>
+              <a:rPr lang="fr-FR" sz="1200" dirty="0" smtClean="0"/>
+              <a:t>1 = </a:t>
+            </a:r>
+            <a:r>
+              <a:rPr lang="fr-FR" sz="1200" dirty="0" err="1" smtClean="0"/>
+              <a:t>Low</a:t>
+            </a:r>
+            <a:r>
+              <a:rPr lang="fr-FR" sz="1200" dirty="0" smtClean="0"/>
+              <a:t>    2 = Medium    3= High    4 = </a:t>
+            </a:r>
+            <a:r>
+              <a:rPr lang="fr-FR" sz="1200" dirty="0" err="1" smtClean="0"/>
+              <a:t>Very</a:t>
+            </a:r>
+            <a:r>
+              <a:rPr lang="fr-FR" sz="1200" dirty="0" smtClean="0"/>
+              <a:t> High</a:t>
+            </a:r>
+            <a:endParaRPr lang="en-US" sz="1200" dirty="0"/>
           </a:p>
         </p:txBody>
       </p:sp>
       <p:pic>
         <p:nvPicPr>
-          <p:cNvPr id="1026" name="Picture 2" descr="C:\Users\mtran\AppData\Local\Temp\SNAGHTML243446a.PNG"/>
+          <p:cNvPr id="5122" name="Picture 2" descr="C:\Users\mtran\AppData\Local\Temp\SNAGHTML5e12b7.PNG"/>
           <p:cNvPicPr>
             <a:picLocks noChangeAspect="1" noChangeArrowheads="1"/>
           </p:cNvPicPr>
@@ -7628,8 +9062,8 @@
         </p:blipFill>
         <p:spPr bwMode="auto">
           <a:xfrm>
-            <a:off x="7364450" y="5213492"/>
-            <a:ext cx="3884797" cy="1123904"/>
+            <a:off x="261266" y="2218484"/>
+            <a:ext cx="7085778" cy="3905870"/>
           </a:xfrm>
           <a:prstGeom prst="rect">
             <a:avLst/>
@@ -7648,26 +9082,43 @@
       </p:pic>
       <p:pic>
         <p:nvPicPr>
-          <p:cNvPr id="13" name="Picture 12"/>
+          <p:cNvPr id="3" name="Picture 2" descr="C:\Users\mtran\AppData\Local\Temp\SNAGHTML53b79c.PNG"/>
           <p:cNvPicPr>
-            <a:picLocks noChangeAspect="1"/>
+            <a:picLocks noChangeAspect="1" noChangeArrowheads="1"/>
           </p:cNvPicPr>
           <p:nvPr/>
         </p:nvPicPr>
         <p:blipFill>
-          <a:blip r:embed="rId5"/>
+          <a:blip r:embed="rId5">
+            <a:extLst>
+              <a:ext uri="{28A0092B-C50C-407E-A947-70E740481C1C}">
+                <a14:useLocalDpi xmlns:a14="http://schemas.microsoft.com/office/drawing/2010/main" val="0"/>
+              </a:ext>
+            </a:extLst>
+          </a:blip>
+          <a:srcRect/>
           <a:stretch>
             <a:fillRect/>
           </a:stretch>
         </p:blipFill>
-        <p:spPr>
+        <p:spPr bwMode="auto">
           <a:xfrm>
-            <a:off x="7544243" y="2768247"/>
-            <a:ext cx="3705004" cy="1825017"/>
+            <a:off x="7347044" y="5161444"/>
+            <a:ext cx="4791075" cy="1314451"/>
           </a:xfrm>
           <a:prstGeom prst="rect">
             <a:avLst/>
           </a:prstGeom>
+          <a:noFill/>
+          <a:extLst>
+            <a:ext uri="{909E8E84-426E-40DD-AFC4-6F175D3DCCD1}">
+              <a14:hiddenFill xmlns:a14="http://schemas.microsoft.com/office/drawing/2010/main">
+                <a:solidFill>
+                  <a:srgbClr val="FFFFFF"/>
+                </a:solidFill>
+              </a14:hiddenFill>
+            </a:ext>
+          </a:extLst>
         </p:spPr>
       </p:pic>
     </p:spTree>
@@ -7680,6 +9131,13 @@
   <p:clrMapOvr>
     <a:masterClrMapping/>
   </p:clrMapOvr>
+  <p:timing>
+    <p:tnLst>
+      <p:par>
+        <p:cTn id="1" dur="indefinite" restart="never" nodeType="tmRoot"/>
+      </p:par>
+    </p:tnLst>
+  </p:timing>
 </p:sld>
 </file>
 
@@ -7753,32 +9211,6 @@
       </p:sp>
       <p:pic>
         <p:nvPicPr>
-          <p:cNvPr id="7" name="Content Placeholder 6"/>
-          <p:cNvPicPr>
-            <a:picLocks noGrp="1" noChangeAspect="1"/>
-          </p:cNvPicPr>
-          <p:nvPr>
-            <p:ph sz="half" idx="2"/>
-          </p:nvPr>
-        </p:nvPicPr>
-        <p:blipFill>
-          <a:blip r:embed="rId3"/>
-          <a:stretch>
-            <a:fillRect/>
-          </a:stretch>
-        </p:blipFill>
-        <p:spPr>
-          <a:xfrm>
-            <a:off x="5305647" y="2020642"/>
-            <a:ext cx="6159645" cy="4047767"/>
-          </a:xfrm>
-          <a:prstGeom prst="rect">
-            <a:avLst/>
-          </a:prstGeom>
-        </p:spPr>
-      </p:pic>
-      <p:pic>
-        <p:nvPicPr>
           <p:cNvPr id="8" name="Picture 7"/>
           <p:cNvPicPr>
             <a:picLocks noChangeAspect="1"/>
@@ -7786,7 +9218,7 @@
           <p:nvPr/>
         </p:nvPicPr>
         <p:blipFill>
-          <a:blip r:embed="rId4"/>
+          <a:blip r:embed="rId3"/>
           <a:stretch>
             <a:fillRect/>
           </a:stretch>
@@ -7801,9 +9233,79 @@
           </a:prstGeom>
         </p:spPr>
       </p:pic>
+      <p:sp>
+        <p:nvSpPr>
+          <p:cNvPr id="9" name="TextBox 8"/>
+          <p:cNvSpPr txBox="1"/>
+          <p:nvPr/>
+        </p:nvSpPr>
+        <p:spPr>
+          <a:xfrm>
+            <a:off x="6698781" y="6244777"/>
+            <a:ext cx="3710494" cy="276999"/>
+          </a:xfrm>
+          <a:prstGeom prst="rect">
+            <a:avLst/>
+          </a:prstGeom>
+          <a:noFill/>
+        </p:spPr>
+        <p:txBody>
+          <a:bodyPr wrap="square" rtlCol="0">
+            <a:spAutoFit/>
+          </a:bodyPr>
+          <a:lstStyle/>
+          <a:p>
+            <a:r>
+              <a:rPr lang="fr-FR" sz="1200" dirty="0" smtClean="0"/>
+              <a:t>1 = </a:t>
+            </a:r>
+            <a:r>
+              <a:rPr lang="fr-FR" sz="1200" dirty="0" err="1" smtClean="0"/>
+              <a:t>Low</a:t>
+            </a:r>
+            <a:r>
+              <a:rPr lang="fr-FR" sz="1200" dirty="0" smtClean="0"/>
+              <a:t>    2 = Medium    3= High    4 = </a:t>
+            </a:r>
+            <a:r>
+              <a:rPr lang="fr-FR" sz="1200" dirty="0" err="1" smtClean="0"/>
+              <a:t>Very</a:t>
+            </a:r>
+            <a:r>
+              <a:rPr lang="fr-FR" sz="1200" dirty="0" smtClean="0"/>
+              <a:t> High</a:t>
+            </a:r>
+            <a:endParaRPr lang="en-US" sz="1200" dirty="0"/>
+          </a:p>
+        </p:txBody>
+      </p:sp>
       <p:pic>
         <p:nvPicPr>
-          <p:cNvPr id="2052" name="Picture 4" descr="C:\Users\mtran\AppData\Local\Temp\SNAGHTML24e60b1.PNG"/>
+          <p:cNvPr id="6" name="Picture 5"/>
+          <p:cNvPicPr>
+            <a:picLocks noChangeAspect="1"/>
+          </p:cNvPicPr>
+          <p:nvPr/>
+        </p:nvPicPr>
+        <p:blipFill>
+          <a:blip r:embed="rId4"/>
+          <a:stretch>
+            <a:fillRect/>
+          </a:stretch>
+        </p:blipFill>
+        <p:spPr>
+          <a:xfrm>
+            <a:off x="5428822" y="2051946"/>
+            <a:ext cx="6229127" cy="3934185"/>
+          </a:xfrm>
+          <a:prstGeom prst="rect">
+            <a:avLst/>
+          </a:prstGeom>
+        </p:spPr>
+      </p:pic>
+      <p:pic>
+        <p:nvPicPr>
+          <p:cNvPr id="2050" name="Picture 2" descr="C:\Users\mtran\AppData\Local\Temp\SNAGHTML5506c5.PNG"/>
           <p:cNvPicPr>
             <a:picLocks noChangeAspect="1" noChangeArrowheads="1"/>
           </p:cNvPicPr>
@@ -7824,8 +9326,8 @@
         </p:blipFill>
         <p:spPr bwMode="auto">
           <a:xfrm>
-            <a:off x="619998" y="4888278"/>
-            <a:ext cx="4562475" cy="1333501"/>
+            <a:off x="252961" y="5049775"/>
+            <a:ext cx="4991100" cy="1333501"/>
           </a:xfrm>
           <a:prstGeom prst="rect">
             <a:avLst/>
@@ -7852,6 +9354,13 @@
   <p:clrMapOvr>
     <a:masterClrMapping/>
   </p:clrMapOvr>
+  <p:timing>
+    <p:tnLst>
+      <p:par>
+        <p:cTn id="1" dur="indefinite" restart="never" nodeType="tmRoot"/>
+      </p:par>
+    </p:tnLst>
+  </p:timing>
 </p:sld>
 </file>
 
@@ -7895,32 +9404,6 @@
           </a:p>
         </p:txBody>
       </p:sp>
-      <p:pic>
-        <p:nvPicPr>
-          <p:cNvPr id="6" name="Content Placeholder 5"/>
-          <p:cNvPicPr>
-            <a:picLocks noGrp="1" noChangeAspect="1"/>
-          </p:cNvPicPr>
-          <p:nvPr>
-            <p:ph sz="half" idx="1"/>
-          </p:nvPr>
-        </p:nvPicPr>
-        <p:blipFill>
-          <a:blip r:embed="rId3"/>
-          <a:stretch>
-            <a:fillRect/>
-          </a:stretch>
-        </p:blipFill>
-        <p:spPr>
-          <a:xfrm>
-            <a:off x="385667" y="2092126"/>
-            <a:ext cx="5968892" cy="3904800"/>
-          </a:xfrm>
-          <a:prstGeom prst="rect">
-            <a:avLst/>
-          </a:prstGeom>
-        </p:spPr>
-      </p:pic>
       <p:sp>
         <p:nvSpPr>
           <p:cNvPr id="5" name="Content Placeholder 4"/>
@@ -7958,7 +9441,7 @@
           <p:nvPr/>
         </p:nvPicPr>
         <p:blipFill>
-          <a:blip r:embed="rId4"/>
+          <a:blip r:embed="rId3"/>
           <a:stretch>
             <a:fillRect/>
           </a:stretch>
@@ -7973,9 +9456,79 @@
           </a:prstGeom>
         </p:spPr>
       </p:pic>
+      <p:sp>
+        <p:nvSpPr>
+          <p:cNvPr id="9" name="TextBox 8"/>
+          <p:cNvSpPr txBox="1"/>
+          <p:nvPr/>
+        </p:nvSpPr>
+        <p:spPr>
+          <a:xfrm>
+            <a:off x="2016666" y="6041453"/>
+            <a:ext cx="3710494" cy="276999"/>
+          </a:xfrm>
+          <a:prstGeom prst="rect">
+            <a:avLst/>
+          </a:prstGeom>
+          <a:noFill/>
+        </p:spPr>
+        <p:txBody>
+          <a:bodyPr wrap="square" rtlCol="0">
+            <a:spAutoFit/>
+          </a:bodyPr>
+          <a:lstStyle/>
+          <a:p>
+            <a:r>
+              <a:rPr lang="fr-FR" sz="1200" dirty="0" smtClean="0"/>
+              <a:t>1 = </a:t>
+            </a:r>
+            <a:r>
+              <a:rPr lang="fr-FR" sz="1200" dirty="0" err="1" smtClean="0"/>
+              <a:t>Low</a:t>
+            </a:r>
+            <a:r>
+              <a:rPr lang="fr-FR" sz="1200" dirty="0" smtClean="0"/>
+              <a:t>    2 = Medium    3= High    4 = </a:t>
+            </a:r>
+            <a:r>
+              <a:rPr lang="fr-FR" sz="1200" dirty="0" err="1" smtClean="0"/>
+              <a:t>Very</a:t>
+            </a:r>
+            <a:r>
+              <a:rPr lang="fr-FR" sz="1200" dirty="0" smtClean="0"/>
+              <a:t> High</a:t>
+            </a:r>
+            <a:endParaRPr lang="en-US" sz="1200" dirty="0"/>
+          </a:p>
+        </p:txBody>
+      </p:sp>
       <p:pic>
         <p:nvPicPr>
-          <p:cNvPr id="3074" name="Picture 2" descr="C:\Users\mtran\AppData\Local\Temp\SNAGHTML253f6d8.PNG"/>
+          <p:cNvPr id="7" name="Picture 6"/>
+          <p:cNvPicPr>
+            <a:picLocks noChangeAspect="1"/>
+          </p:cNvPicPr>
+          <p:nvPr/>
+        </p:nvPicPr>
+        <p:blipFill>
+          <a:blip r:embed="rId4"/>
+          <a:stretch>
+            <a:fillRect/>
+          </a:stretch>
+        </p:blipFill>
+        <p:spPr>
+          <a:xfrm>
+            <a:off x="411072" y="2092126"/>
+            <a:ext cx="5990392" cy="3766414"/>
+          </a:xfrm>
+          <a:prstGeom prst="rect">
+            <a:avLst/>
+          </a:prstGeom>
+        </p:spPr>
+      </p:pic>
+      <p:pic>
+        <p:nvPicPr>
+          <p:cNvPr id="3" name="Picture 2" descr="C:\Users\mtran\AppData\Local\Temp\SNAGHTML55cf8f.PNG"/>
           <p:cNvPicPr>
             <a:picLocks noChangeAspect="1" noChangeArrowheads="1"/>
           </p:cNvPicPr>
@@ -7996,8 +9549,8 @@
         </p:blipFill>
         <p:spPr bwMode="auto">
           <a:xfrm>
-            <a:off x="6737128" y="4587226"/>
-            <a:ext cx="4591050" cy="1409700"/>
+            <a:off x="6690150" y="4550661"/>
+            <a:ext cx="5048250" cy="1409700"/>
           </a:xfrm>
           <a:prstGeom prst="rect">
             <a:avLst/>
@@ -8024,6 +9577,13 @@
   <p:clrMapOvr>
     <a:masterClrMapping/>
   </p:clrMapOvr>
+  <p:timing>
+    <p:tnLst>
+      <p:par>
+        <p:cTn id="1" dur="indefinite" restart="never" nodeType="tmRoot"/>
+      </p:par>
+    </p:tnLst>
+  </p:timing>
 </p:sld>
 </file>
 
@@ -8079,7 +9639,7 @@
         </p:nvSpPr>
         <p:spPr>
           <a:xfrm>
-            <a:off x="581193" y="2228003"/>
+            <a:off x="581193" y="1981899"/>
             <a:ext cx="5422390" cy="632155"/>
           </a:xfrm>
         </p:spPr>
@@ -8097,13 +9657,11 @@
       </p:sp>
       <p:pic>
         <p:nvPicPr>
-          <p:cNvPr id="6" name="Content Placeholder 5"/>
+          <p:cNvPr id="8" name="Picture 7"/>
           <p:cNvPicPr>
-            <a:picLocks noGrp="1" noChangeAspect="1"/>
+            <a:picLocks noChangeAspect="1"/>
           </p:cNvPicPr>
-          <p:nvPr>
-            <p:ph sz="half" idx="2"/>
-          </p:nvPr>
+          <p:nvPr/>
         </p:nvPicPr>
         <p:blipFill>
           <a:blip r:embed="rId3"/>
@@ -8113,8 +9671,8 @@
         </p:blipFill>
         <p:spPr>
           <a:xfrm>
-            <a:off x="5305647" y="1996633"/>
-            <a:ext cx="6178697" cy="3771772"/>
+            <a:off x="888761" y="2738679"/>
+            <a:ext cx="3531002" cy="1737628"/>
           </a:xfrm>
           <a:prstGeom prst="rect">
             <a:avLst/>
@@ -8123,50 +9681,130 @@
       </p:pic>
       <p:pic>
         <p:nvPicPr>
-          <p:cNvPr id="7" name="Picture 6"/>
+          <p:cNvPr id="2050" name="Picture 2" descr="C:\Users\mtran\AppData\Local\Temp\SNAGHTML5bee55.PNG"/>
           <p:cNvPicPr>
-            <a:picLocks noChangeAspect="1"/>
+            <a:picLocks noChangeAspect="1" noChangeArrowheads="1"/>
           </p:cNvPicPr>
           <p:nvPr/>
         </p:nvPicPr>
         <p:blipFill>
-          <a:blip r:embed="rId4"/>
+          <a:blip r:embed="rId4">
+            <a:extLst>
+              <a:ext uri="{28A0092B-C50C-407E-A947-70E740481C1C}">
+                <a14:useLocalDpi xmlns:a14="http://schemas.microsoft.com/office/drawing/2010/main" val="0"/>
+              </a:ext>
+            </a:extLst>
+          </a:blip>
+          <a:srcRect/>
           <a:stretch>
             <a:fillRect/>
           </a:stretch>
         </p:blipFill>
-        <p:spPr>
+        <p:spPr bwMode="auto">
           <a:xfrm>
-            <a:off x="715767" y="5257821"/>
-            <a:ext cx="3657917" cy="1021168"/>
+            <a:off x="5135525" y="1981899"/>
+            <a:ext cx="6127971" cy="3956125"/>
           </a:xfrm>
           <a:prstGeom prst="rect">
             <a:avLst/>
           </a:prstGeom>
+          <a:noFill/>
+          <a:extLst>
+            <a:ext uri="{909E8E84-426E-40DD-AFC4-6F175D3DCCD1}">
+              <a14:hiddenFill xmlns:a14="http://schemas.microsoft.com/office/drawing/2010/main">
+                <a:solidFill>
+                  <a:srgbClr val="FFFFFF"/>
+                </a:solidFill>
+              </a14:hiddenFill>
+            </a:ext>
+          </a:extLst>
         </p:spPr>
       </p:pic>
+      <p:sp>
+        <p:nvSpPr>
+          <p:cNvPr id="10" name="TextBox 9"/>
+          <p:cNvSpPr txBox="1"/>
+          <p:nvPr/>
+        </p:nvSpPr>
+        <p:spPr>
+          <a:xfrm>
+            <a:off x="6684359" y="6001990"/>
+            <a:ext cx="3710494" cy="276999"/>
+          </a:xfrm>
+          <a:prstGeom prst="rect">
+            <a:avLst/>
+          </a:prstGeom>
+          <a:noFill/>
+        </p:spPr>
+        <p:txBody>
+          <a:bodyPr wrap="square" rtlCol="0">
+            <a:spAutoFit/>
+          </a:bodyPr>
+          <a:lstStyle/>
+          <a:p>
+            <a:r>
+              <a:rPr lang="fr-FR" sz="1200" dirty="0" smtClean="0"/>
+              <a:t>1 = </a:t>
+            </a:r>
+            <a:r>
+              <a:rPr lang="fr-FR" sz="1200" dirty="0" err="1" smtClean="0"/>
+              <a:t>Low</a:t>
+            </a:r>
+            <a:r>
+              <a:rPr lang="fr-FR" sz="1200" dirty="0" smtClean="0"/>
+              <a:t>    2 = Medium    3= High    4 = </a:t>
+            </a:r>
+            <a:r>
+              <a:rPr lang="fr-FR" sz="1200" dirty="0" err="1" smtClean="0"/>
+              <a:t>Very</a:t>
+            </a:r>
+            <a:r>
+              <a:rPr lang="fr-FR" sz="1200" dirty="0" smtClean="0"/>
+              <a:t> High</a:t>
+            </a:r>
+            <a:endParaRPr lang="en-US" sz="1200" dirty="0"/>
+          </a:p>
+        </p:txBody>
+      </p:sp>
       <p:pic>
         <p:nvPicPr>
-          <p:cNvPr id="8" name="Picture 7"/>
+          <p:cNvPr id="4098" name="Picture 2" descr="C:\Users\mtran\AppData\Local\Temp\SNAGHTML5750df.PNG"/>
           <p:cNvPicPr>
-            <a:picLocks noChangeAspect="1"/>
+            <a:picLocks noChangeAspect="1" noChangeArrowheads="1"/>
           </p:cNvPicPr>
           <p:nvPr/>
         </p:nvPicPr>
         <p:blipFill>
-          <a:blip r:embed="rId5"/>
+          <a:blip r:embed="rId5">
+            <a:extLst>
+              <a:ext uri="{28A0092B-C50C-407E-A947-70E740481C1C}">
+                <a14:useLocalDpi xmlns:a14="http://schemas.microsoft.com/office/drawing/2010/main" val="0"/>
+              </a:ext>
+            </a:extLst>
+          </a:blip>
+          <a:srcRect/>
           <a:stretch>
             <a:fillRect/>
           </a:stretch>
         </p:blipFill>
-        <p:spPr>
+        <p:spPr bwMode="auto">
           <a:xfrm>
-            <a:off x="842682" y="2975384"/>
-            <a:ext cx="3531002" cy="1660411"/>
+            <a:off x="173000" y="4925583"/>
+            <a:ext cx="4962525" cy="1276350"/>
           </a:xfrm>
           <a:prstGeom prst="rect">
             <a:avLst/>
           </a:prstGeom>
+          <a:noFill/>
+          <a:extLst>
+            <a:ext uri="{909E8E84-426E-40DD-AFC4-6F175D3DCCD1}">
+              <a14:hiddenFill xmlns:a14="http://schemas.microsoft.com/office/drawing/2010/main">
+                <a:solidFill>
+                  <a:srgbClr val="FFFFFF"/>
+                </a:solidFill>
+              </a14:hiddenFill>
+            </a:ext>
+          </a:extLst>
         </p:spPr>
       </p:pic>
     </p:spTree>
@@ -8179,6 +9817,13 @@
   <p:clrMapOvr>
     <a:masterClrMapping/>
   </p:clrMapOvr>
+  <p:timing>
+    <p:tnLst>
+      <p:par>
+        <p:cTn id="1" dur="indefinite" restart="never" nodeType="tmRoot"/>
+      </p:par>
+    </p:tnLst>
+  </p:timing>
 </p:sld>
 </file>
 

</xml_diff>